<commit_message>
Finished PowerPoint, awaiting for feedback
</commit_message>
<xml_diff>
--- a/Week 1 docs/JUKEVOTE.pptx
+++ b/Week 1 docs/JUKEVOTE.pptx
@@ -12,9 +12,12 @@
     <p:sldId id="260" r:id="rId6"/>
     <p:sldId id="261" r:id="rId7"/>
     <p:sldId id="262" r:id="rId8"/>
-    <p:sldId id="264" r:id="rId9"/>
-    <p:sldId id="265" r:id="rId10"/>
-    <p:sldId id="266" r:id="rId11"/>
+    <p:sldId id="267" r:id="rId9"/>
+    <p:sldId id="268" r:id="rId10"/>
+    <p:sldId id="264" r:id="rId11"/>
+    <p:sldId id="265" r:id="rId12"/>
+    <p:sldId id="266" r:id="rId13"/>
+    <p:sldId id="269" r:id="rId14"/>
   </p:sldIdLst>
   <p:sldSz cx="12192000" cy="6858000"/>
   <p:notesSz cx="6858000" cy="9144000"/>
@@ -125,9 +128,12 @@
             <p14:sldId id="260"/>
             <p14:sldId id="261"/>
             <p14:sldId id="262"/>
+            <p14:sldId id="267"/>
+            <p14:sldId id="268"/>
             <p14:sldId id="264"/>
             <p14:sldId id="265"/>
             <p14:sldId id="266"/>
+            <p14:sldId id="269"/>
           </p14:sldIdLst>
         </p14:section>
       </p14:sectionLst>
@@ -5492,7 +5498,7 @@
                   <a:schemeClr val="tx1"/>
                 </a:solidFill>
               </a:rPr>
-              <a:t>Juan</a:t>
+              <a:t>Rodríguez Regidor, Juan</a:t>
             </a:r>
           </a:p>
         </p:txBody>
@@ -5555,7 +5561,7 @@
           <a:p>
             <a:r>
               <a:rPr lang="es-ES" dirty="0"/>
-              <a:t>COSTS PLACEHOLDER</a:t>
+              <a:t>OUR COMPETITORS</a:t>
             </a:r>
           </a:p>
         </p:txBody>
@@ -5588,17 +5594,2045 @@
           </a:bodyPr>
           <a:lstStyle/>
           <a:p>
-            <a:pPr marL="0" indent="0">
-              <a:buNone/>
-            </a:pPr>
+            <a:r>
+              <a:rPr lang="es-ES" dirty="0">
+                <a:solidFill>
+                  <a:schemeClr val="tx1"/>
+                </a:solidFill>
+              </a:rPr>
+              <a:t>play.festa.co: </a:t>
+            </a:r>
+            <a:r>
+              <a:rPr lang="es-ES" dirty="0" err="1">
+                <a:solidFill>
+                  <a:schemeClr val="tx1"/>
+                </a:solidFill>
+              </a:rPr>
+              <a:t>Creates</a:t>
+            </a:r>
+            <a:r>
+              <a:rPr lang="es-ES" dirty="0">
+                <a:solidFill>
+                  <a:schemeClr val="tx1"/>
+                </a:solidFill>
+              </a:rPr>
+              <a:t> </a:t>
+            </a:r>
+            <a:r>
+              <a:rPr lang="es-ES" dirty="0" err="1">
+                <a:solidFill>
+                  <a:schemeClr val="tx1"/>
+                </a:solidFill>
+              </a:rPr>
+              <a:t>an</a:t>
+            </a:r>
+            <a:r>
+              <a:rPr lang="es-ES" dirty="0">
+                <a:solidFill>
+                  <a:schemeClr val="tx1"/>
+                </a:solidFill>
+              </a:rPr>
+              <a:t> </a:t>
+            </a:r>
+            <a:r>
+              <a:rPr lang="es-ES" dirty="0" err="1">
+                <a:solidFill>
+                  <a:schemeClr val="tx1"/>
+                </a:solidFill>
+              </a:rPr>
+              <a:t>empty</a:t>
+            </a:r>
+            <a:r>
+              <a:rPr lang="es-ES" dirty="0">
+                <a:solidFill>
+                  <a:schemeClr val="tx1"/>
+                </a:solidFill>
+              </a:rPr>
+              <a:t> </a:t>
+            </a:r>
+            <a:r>
+              <a:rPr lang="es-ES" dirty="0" err="1">
+                <a:solidFill>
+                  <a:schemeClr val="tx1"/>
+                </a:solidFill>
+              </a:rPr>
+              <a:t>playlist</a:t>
+            </a:r>
+            <a:r>
+              <a:rPr lang="es-ES" dirty="0">
+                <a:solidFill>
+                  <a:schemeClr val="tx1"/>
+                </a:solidFill>
+              </a:rPr>
+              <a:t> </a:t>
+            </a:r>
+            <a:r>
+              <a:rPr lang="es-ES" dirty="0" err="1">
+                <a:solidFill>
+                  <a:schemeClr val="tx1"/>
+                </a:solidFill>
+              </a:rPr>
+              <a:t>where</a:t>
+            </a:r>
+            <a:r>
+              <a:rPr lang="es-ES" dirty="0">
+                <a:solidFill>
+                  <a:schemeClr val="tx1"/>
+                </a:solidFill>
+              </a:rPr>
+              <a:t> </a:t>
+            </a:r>
+            <a:r>
+              <a:rPr lang="es-ES" dirty="0" err="1">
+                <a:solidFill>
+                  <a:schemeClr val="tx1"/>
+                </a:solidFill>
+              </a:rPr>
+              <a:t>people</a:t>
+            </a:r>
+            <a:r>
+              <a:rPr lang="es-ES" dirty="0">
+                <a:solidFill>
+                  <a:schemeClr val="tx1"/>
+                </a:solidFill>
+              </a:rPr>
+              <a:t> can </a:t>
+            </a:r>
+            <a:r>
+              <a:rPr lang="es-ES" dirty="0" err="1">
+                <a:solidFill>
+                  <a:schemeClr val="tx1"/>
+                </a:solidFill>
+              </a:rPr>
+              <a:t>add</a:t>
+            </a:r>
+            <a:r>
+              <a:rPr lang="es-ES" dirty="0">
+                <a:solidFill>
+                  <a:schemeClr val="tx1"/>
+                </a:solidFill>
+              </a:rPr>
+              <a:t> </a:t>
+            </a:r>
+            <a:r>
+              <a:rPr lang="es-ES" dirty="0" err="1">
+                <a:solidFill>
+                  <a:schemeClr val="tx1"/>
+                </a:solidFill>
+              </a:rPr>
+              <a:t>the</a:t>
+            </a:r>
+            <a:r>
+              <a:rPr lang="es-ES" dirty="0">
+                <a:solidFill>
+                  <a:schemeClr val="tx1"/>
+                </a:solidFill>
+              </a:rPr>
+              <a:t> </a:t>
+            </a:r>
+            <a:r>
+              <a:rPr lang="es-ES" dirty="0" err="1">
+                <a:solidFill>
+                  <a:schemeClr val="tx1"/>
+                </a:solidFill>
+              </a:rPr>
+              <a:t>songs</a:t>
+            </a:r>
+            <a:r>
+              <a:rPr lang="es-ES" dirty="0">
+                <a:solidFill>
+                  <a:schemeClr val="tx1"/>
+                </a:solidFill>
+              </a:rPr>
+              <a:t> </a:t>
+            </a:r>
+            <a:r>
+              <a:rPr lang="es-ES" dirty="0" err="1">
+                <a:solidFill>
+                  <a:schemeClr val="tx1"/>
+                </a:solidFill>
+              </a:rPr>
+              <a:t>from</a:t>
+            </a:r>
+            <a:r>
+              <a:rPr lang="es-ES" dirty="0">
+                <a:solidFill>
+                  <a:schemeClr val="tx1"/>
+                </a:solidFill>
+              </a:rPr>
+              <a:t> </a:t>
+            </a:r>
+            <a:r>
+              <a:rPr lang="es-ES" dirty="0" err="1">
+                <a:solidFill>
+                  <a:schemeClr val="tx1"/>
+                </a:solidFill>
+              </a:rPr>
+              <a:t>Youtube</a:t>
+            </a:r>
+            <a:r>
+              <a:rPr lang="es-ES" dirty="0">
+                <a:solidFill>
+                  <a:schemeClr val="tx1"/>
+                </a:solidFill>
+              </a:rPr>
+              <a:t> </a:t>
+            </a:r>
+            <a:r>
+              <a:rPr lang="es-ES" dirty="0" err="1">
+                <a:solidFill>
+                  <a:schemeClr val="tx1"/>
+                </a:solidFill>
+              </a:rPr>
+              <a:t>they</a:t>
+            </a:r>
+            <a:r>
+              <a:rPr lang="es-ES" dirty="0">
+                <a:solidFill>
+                  <a:schemeClr val="tx1"/>
+                </a:solidFill>
+              </a:rPr>
+              <a:t> </a:t>
+            </a:r>
+            <a:r>
+              <a:rPr lang="es-ES" dirty="0" err="1">
+                <a:solidFill>
+                  <a:schemeClr val="tx1"/>
+                </a:solidFill>
+              </a:rPr>
+              <a:t>want</a:t>
+            </a:r>
+            <a:r>
+              <a:rPr lang="es-ES" dirty="0">
+                <a:solidFill>
+                  <a:schemeClr val="tx1"/>
+                </a:solidFill>
+              </a:rPr>
+              <a:t>. </a:t>
+            </a:r>
+            <a:r>
+              <a:rPr lang="es-ES" dirty="0" err="1">
+                <a:solidFill>
+                  <a:schemeClr val="tx1"/>
+                </a:solidFill>
+              </a:rPr>
+              <a:t>It</a:t>
+            </a:r>
+            <a:r>
+              <a:rPr lang="es-ES" dirty="0">
+                <a:solidFill>
+                  <a:schemeClr val="tx1"/>
+                </a:solidFill>
+              </a:rPr>
+              <a:t> </a:t>
+            </a:r>
+            <a:r>
+              <a:rPr lang="es-ES" dirty="0" err="1">
+                <a:solidFill>
+                  <a:schemeClr val="tx1"/>
+                </a:solidFill>
+              </a:rPr>
+              <a:t>does</a:t>
+            </a:r>
+            <a:r>
+              <a:rPr lang="es-ES" dirty="0">
+                <a:solidFill>
+                  <a:schemeClr val="tx1"/>
+                </a:solidFill>
+              </a:rPr>
+              <a:t> </a:t>
+            </a:r>
+            <a:r>
+              <a:rPr lang="es-ES" dirty="0" err="1">
+                <a:solidFill>
+                  <a:schemeClr val="tx1"/>
+                </a:solidFill>
+              </a:rPr>
+              <a:t>not</a:t>
+            </a:r>
+            <a:r>
+              <a:rPr lang="es-ES" dirty="0">
+                <a:solidFill>
+                  <a:schemeClr val="tx1"/>
+                </a:solidFill>
+              </a:rPr>
+              <a:t> </a:t>
+            </a:r>
+            <a:r>
+              <a:rPr lang="es-ES" dirty="0" err="1">
+                <a:solidFill>
+                  <a:schemeClr val="tx1"/>
+                </a:solidFill>
+              </a:rPr>
+              <a:t>include</a:t>
+            </a:r>
+            <a:r>
+              <a:rPr lang="es-ES" dirty="0">
+                <a:solidFill>
+                  <a:schemeClr val="tx1"/>
+                </a:solidFill>
+              </a:rPr>
+              <a:t> </a:t>
+            </a:r>
+            <a:r>
+              <a:rPr lang="es-ES" dirty="0" err="1">
+                <a:solidFill>
+                  <a:schemeClr val="tx1"/>
+                </a:solidFill>
+              </a:rPr>
+              <a:t>any</a:t>
+            </a:r>
+            <a:r>
+              <a:rPr lang="es-ES" dirty="0">
+                <a:solidFill>
+                  <a:schemeClr val="tx1"/>
+                </a:solidFill>
+              </a:rPr>
+              <a:t> </a:t>
+            </a:r>
+            <a:r>
+              <a:rPr lang="es-ES" dirty="0" err="1">
+                <a:solidFill>
+                  <a:schemeClr val="tx1"/>
+                </a:solidFill>
+              </a:rPr>
+              <a:t>maps</a:t>
+            </a:r>
+            <a:r>
+              <a:rPr lang="es-ES" dirty="0">
+                <a:solidFill>
+                  <a:schemeClr val="tx1"/>
+                </a:solidFill>
+              </a:rPr>
+              <a:t> and </a:t>
+            </a:r>
+            <a:r>
+              <a:rPr lang="es-ES" dirty="0" err="1">
+                <a:solidFill>
+                  <a:schemeClr val="tx1"/>
+                </a:solidFill>
+              </a:rPr>
+              <a:t>the</a:t>
+            </a:r>
+            <a:r>
+              <a:rPr lang="es-ES" dirty="0">
+                <a:solidFill>
+                  <a:schemeClr val="tx1"/>
+                </a:solidFill>
+              </a:rPr>
+              <a:t> </a:t>
+            </a:r>
+            <a:r>
+              <a:rPr lang="es-ES" dirty="0" err="1">
+                <a:solidFill>
+                  <a:schemeClr val="tx1"/>
+                </a:solidFill>
+              </a:rPr>
+              <a:t>owner</a:t>
+            </a:r>
+            <a:r>
+              <a:rPr lang="es-ES" dirty="0">
+                <a:solidFill>
+                  <a:schemeClr val="tx1"/>
+                </a:solidFill>
+              </a:rPr>
+              <a:t> </a:t>
+            </a:r>
+            <a:r>
+              <a:rPr lang="es-ES" dirty="0" err="1">
+                <a:solidFill>
+                  <a:schemeClr val="tx1"/>
+                </a:solidFill>
+              </a:rPr>
+              <a:t>can’t</a:t>
+            </a:r>
+            <a:r>
+              <a:rPr lang="es-ES" dirty="0">
+                <a:solidFill>
+                  <a:schemeClr val="tx1"/>
+                </a:solidFill>
+              </a:rPr>
+              <a:t> créate a </a:t>
+            </a:r>
+            <a:r>
+              <a:rPr lang="es-ES" dirty="0" err="1">
+                <a:solidFill>
+                  <a:schemeClr val="tx1"/>
+                </a:solidFill>
+              </a:rPr>
+              <a:t>fixed</a:t>
+            </a:r>
+            <a:r>
+              <a:rPr lang="es-ES" dirty="0">
+                <a:solidFill>
+                  <a:schemeClr val="tx1"/>
+                </a:solidFill>
+              </a:rPr>
+              <a:t> </a:t>
+            </a:r>
+            <a:r>
+              <a:rPr lang="es-ES" dirty="0" err="1">
+                <a:solidFill>
+                  <a:schemeClr val="tx1"/>
+                </a:solidFill>
+              </a:rPr>
+              <a:t>playlist</a:t>
+            </a:r>
+            <a:r>
+              <a:rPr lang="es-ES" dirty="0">
+                <a:solidFill>
+                  <a:schemeClr val="tx1"/>
+                </a:solidFill>
+              </a:rPr>
+              <a:t>.</a:t>
+            </a:r>
+          </a:p>
+          <a:p>
+            <a:r>
+              <a:rPr lang="es-ES" dirty="0">
+                <a:solidFill>
+                  <a:schemeClr val="tx1"/>
+                </a:solidFill>
+              </a:rPr>
+              <a:t>http://yourlitzer.com: Similar </a:t>
+            </a:r>
+            <a:r>
+              <a:rPr lang="es-ES" dirty="0" err="1">
+                <a:solidFill>
+                  <a:schemeClr val="tx1"/>
+                </a:solidFill>
+              </a:rPr>
+              <a:t>to</a:t>
+            </a:r>
+            <a:r>
+              <a:rPr lang="es-ES" dirty="0">
+                <a:solidFill>
+                  <a:schemeClr val="tx1"/>
+                </a:solidFill>
+              </a:rPr>
+              <a:t> </a:t>
+            </a:r>
+            <a:r>
+              <a:rPr lang="es-ES" dirty="0" err="1">
+                <a:solidFill>
+                  <a:schemeClr val="tx1"/>
+                </a:solidFill>
+              </a:rPr>
+              <a:t>our</a:t>
+            </a:r>
+            <a:r>
+              <a:rPr lang="es-ES" dirty="0">
+                <a:solidFill>
+                  <a:schemeClr val="tx1"/>
+                </a:solidFill>
+              </a:rPr>
+              <a:t> </a:t>
+            </a:r>
+            <a:r>
+              <a:rPr lang="es-ES" dirty="0" err="1">
+                <a:solidFill>
+                  <a:schemeClr val="tx1"/>
+                </a:solidFill>
+              </a:rPr>
+              <a:t>proposal</a:t>
+            </a:r>
+            <a:r>
+              <a:rPr lang="es-ES" dirty="0">
+                <a:solidFill>
+                  <a:schemeClr val="tx1"/>
+                </a:solidFill>
+              </a:rPr>
+              <a:t>, </a:t>
+            </a:r>
+            <a:r>
+              <a:rPr lang="es-ES" dirty="0" err="1">
+                <a:solidFill>
+                  <a:schemeClr val="tx1"/>
+                </a:solidFill>
+              </a:rPr>
+              <a:t>but</a:t>
+            </a:r>
+            <a:r>
+              <a:rPr lang="es-ES" dirty="0">
+                <a:solidFill>
+                  <a:schemeClr val="tx1"/>
+                </a:solidFill>
+              </a:rPr>
+              <a:t> has no </a:t>
+            </a:r>
+            <a:r>
+              <a:rPr lang="es-ES" dirty="0" err="1">
+                <a:solidFill>
+                  <a:schemeClr val="tx1"/>
+                </a:solidFill>
+              </a:rPr>
+              <a:t>means</a:t>
+            </a:r>
+            <a:r>
+              <a:rPr lang="es-ES" dirty="0">
+                <a:solidFill>
+                  <a:schemeClr val="tx1"/>
+                </a:solidFill>
+              </a:rPr>
+              <a:t> </a:t>
+            </a:r>
+            <a:r>
+              <a:rPr lang="es-ES" dirty="0" err="1">
+                <a:solidFill>
+                  <a:schemeClr val="tx1"/>
+                </a:solidFill>
+              </a:rPr>
+              <a:t>of</a:t>
+            </a:r>
+            <a:r>
+              <a:rPr lang="es-ES" dirty="0">
+                <a:solidFill>
+                  <a:schemeClr val="tx1"/>
+                </a:solidFill>
+              </a:rPr>
+              <a:t> tracking </a:t>
+            </a:r>
+            <a:r>
+              <a:rPr lang="es-ES" dirty="0" err="1">
+                <a:solidFill>
+                  <a:schemeClr val="tx1"/>
+                </a:solidFill>
+              </a:rPr>
+              <a:t>the</a:t>
+            </a:r>
+            <a:r>
+              <a:rPr lang="es-ES" dirty="0">
+                <a:solidFill>
+                  <a:schemeClr val="tx1"/>
+                </a:solidFill>
+              </a:rPr>
+              <a:t> </a:t>
+            </a:r>
+            <a:r>
+              <a:rPr lang="es-ES" dirty="0" err="1">
+                <a:solidFill>
+                  <a:schemeClr val="tx1"/>
+                </a:solidFill>
+              </a:rPr>
+              <a:t>events</a:t>
+            </a:r>
+            <a:r>
+              <a:rPr lang="es-ES" dirty="0">
+                <a:solidFill>
+                  <a:schemeClr val="tx1"/>
+                </a:solidFill>
+              </a:rPr>
+              <a:t> </a:t>
+            </a:r>
+            <a:r>
+              <a:rPr lang="es-ES" dirty="0" err="1">
+                <a:solidFill>
+                  <a:schemeClr val="tx1"/>
+                </a:solidFill>
+              </a:rPr>
+              <a:t>that</a:t>
+            </a:r>
+            <a:r>
+              <a:rPr lang="es-ES" dirty="0">
+                <a:solidFill>
+                  <a:schemeClr val="tx1"/>
+                </a:solidFill>
+              </a:rPr>
+              <a:t> </a:t>
+            </a:r>
+            <a:r>
+              <a:rPr lang="es-ES" dirty="0" err="1">
+                <a:solidFill>
+                  <a:schemeClr val="tx1"/>
+                </a:solidFill>
+              </a:rPr>
+              <a:t>take</a:t>
+            </a:r>
+            <a:r>
+              <a:rPr lang="es-ES" dirty="0">
+                <a:solidFill>
+                  <a:schemeClr val="tx1"/>
+                </a:solidFill>
+              </a:rPr>
+              <a:t> place in </a:t>
+            </a:r>
+            <a:r>
+              <a:rPr lang="es-ES" dirty="0" err="1">
+                <a:solidFill>
+                  <a:schemeClr val="tx1"/>
+                </a:solidFill>
+              </a:rPr>
+              <a:t>the</a:t>
+            </a:r>
+            <a:r>
+              <a:rPr lang="es-ES" dirty="0">
+                <a:solidFill>
+                  <a:schemeClr val="tx1"/>
+                </a:solidFill>
+              </a:rPr>
+              <a:t> </a:t>
+            </a:r>
+            <a:r>
+              <a:rPr lang="es-ES" dirty="0" err="1">
+                <a:solidFill>
+                  <a:schemeClr val="tx1"/>
+                </a:solidFill>
+              </a:rPr>
+              <a:t>venues</a:t>
+            </a:r>
+            <a:r>
+              <a:rPr lang="es-ES" dirty="0">
+                <a:solidFill>
+                  <a:schemeClr val="tx1"/>
+                </a:solidFill>
+              </a:rPr>
+              <a:t> </a:t>
+            </a:r>
+            <a:r>
+              <a:rPr lang="es-ES" dirty="0" err="1">
+                <a:solidFill>
+                  <a:schemeClr val="tx1"/>
+                </a:solidFill>
+              </a:rPr>
+              <a:t>which</a:t>
+            </a:r>
+            <a:r>
+              <a:rPr lang="es-ES" dirty="0">
+                <a:solidFill>
+                  <a:schemeClr val="tx1"/>
+                </a:solidFill>
+              </a:rPr>
+              <a:t> use </a:t>
+            </a:r>
+            <a:r>
+              <a:rPr lang="es-ES" dirty="0" err="1">
+                <a:solidFill>
+                  <a:schemeClr val="tx1"/>
+                </a:solidFill>
+              </a:rPr>
+              <a:t>their</a:t>
+            </a:r>
+            <a:r>
+              <a:rPr lang="es-ES" dirty="0">
+                <a:solidFill>
+                  <a:schemeClr val="tx1"/>
+                </a:solidFill>
+              </a:rPr>
+              <a:t> software.</a:t>
+            </a:r>
+          </a:p>
+          <a:p>
             <a:endParaRPr lang="es-ES" dirty="0"/>
           </a:p>
         </p:txBody>
       </p:sp>
+    </p:spTree>
+    <p:extLst>
+      <p:ext uri="{BB962C8B-B14F-4D97-AF65-F5344CB8AC3E}">
+        <p14:creationId xmlns:p14="http://schemas.microsoft.com/office/powerpoint/2010/main" val="2200108933"/>
+      </p:ext>
+    </p:extLst>
+  </p:cSld>
+  <p:clrMapOvr>
+    <a:masterClrMapping/>
+  </p:clrMapOvr>
+</p:sld>
+</file>
+
+<file path=ppt/slides/slide11.xml><?xml version="1.0" encoding="utf-8"?>
+<p:sld xmlns:a="http://schemas.openxmlformats.org/drawingml/2006/main" xmlns:r="http://schemas.openxmlformats.org/officeDocument/2006/relationships" xmlns:p="http://schemas.openxmlformats.org/presentationml/2006/main">
+  <p:cSld>
+    <p:spTree>
+      <p:nvGrpSpPr>
+        <p:cNvPr id="1" name=""/>
+        <p:cNvGrpSpPr/>
+        <p:nvPr/>
+      </p:nvGrpSpPr>
+      <p:grpSpPr>
+        <a:xfrm>
+          <a:off x="0" y="0"/>
+          <a:ext cx="0" cy="0"/>
+          <a:chOff x="0" y="0"/>
+          <a:chExt cx="0" cy="0"/>
+        </a:xfrm>
+      </p:grpSpPr>
+      <p:sp>
+        <p:nvSpPr>
+          <p:cNvPr id="2" name="Título 1">
+            <a:extLst>
+              <a:ext uri="{FF2B5EF4-FFF2-40B4-BE49-F238E27FC236}">
+                <a16:creationId xmlns:a16="http://schemas.microsoft.com/office/drawing/2014/main" id="{445B603E-5A2D-40D0-A069-499E52FA9FA0}"/>
+              </a:ext>
+            </a:extLst>
+          </p:cNvPr>
+          <p:cNvSpPr>
+            <a:spLocks noGrp="1"/>
+          </p:cNvSpPr>
+          <p:nvPr>
+            <p:ph type="title"/>
+          </p:nvPr>
+        </p:nvSpPr>
+        <p:spPr>
+          <a:xfrm>
+            <a:off x="684212" y="685800"/>
+            <a:ext cx="8534400" cy="1507067"/>
+          </a:xfrm>
+        </p:spPr>
+        <p:txBody>
+          <a:bodyPr/>
+          <a:lstStyle/>
+          <a:p>
+            <a:r>
+              <a:rPr lang="es-ES" dirty="0"/>
+              <a:t>INNOVATION</a:t>
+            </a:r>
+          </a:p>
+        </p:txBody>
+      </p:sp>
+      <p:sp>
+        <p:nvSpPr>
+          <p:cNvPr id="3" name="Marcador de contenido 2">
+            <a:extLst>
+              <a:ext uri="{FF2B5EF4-FFF2-40B4-BE49-F238E27FC236}">
+                <a16:creationId xmlns:a16="http://schemas.microsoft.com/office/drawing/2014/main" id="{40F8E8B8-0492-4855-AC00-14AD2A173FB8}"/>
+              </a:ext>
+            </a:extLst>
+          </p:cNvPr>
+          <p:cNvSpPr>
+            <a:spLocks noGrp="1"/>
+          </p:cNvSpPr>
+          <p:nvPr>
+            <p:ph idx="1"/>
+          </p:nvPr>
+        </p:nvSpPr>
+        <p:spPr>
+          <a:xfrm>
+            <a:off x="684212" y="1669003"/>
+            <a:ext cx="8534400" cy="4216892"/>
+          </a:xfrm>
+        </p:spPr>
+        <p:txBody>
+          <a:bodyPr>
+            <a:normAutofit/>
+          </a:bodyPr>
+          <a:lstStyle/>
+          <a:p>
+            <a:r>
+              <a:rPr lang="es-ES" dirty="0" err="1">
+                <a:solidFill>
+                  <a:schemeClr val="tx1"/>
+                </a:solidFill>
+              </a:rPr>
+              <a:t>JukeVote</a:t>
+            </a:r>
+            <a:r>
+              <a:rPr lang="es-ES" dirty="0">
+                <a:solidFill>
+                  <a:schemeClr val="tx1"/>
+                </a:solidFill>
+              </a:rPr>
+              <a:t> </a:t>
+            </a:r>
+            <a:r>
+              <a:rPr lang="es-ES" dirty="0" err="1">
+                <a:solidFill>
+                  <a:schemeClr val="tx1"/>
+                </a:solidFill>
+              </a:rPr>
+              <a:t>changes</a:t>
+            </a:r>
+            <a:r>
+              <a:rPr lang="es-ES" dirty="0">
+                <a:solidFill>
+                  <a:schemeClr val="tx1"/>
+                </a:solidFill>
+              </a:rPr>
+              <a:t> </a:t>
+            </a:r>
+            <a:r>
+              <a:rPr lang="es-ES" dirty="0" err="1">
+                <a:solidFill>
+                  <a:schemeClr val="tx1"/>
+                </a:solidFill>
+              </a:rPr>
+              <a:t>radically</a:t>
+            </a:r>
+            <a:r>
+              <a:rPr lang="es-ES" dirty="0">
+                <a:solidFill>
+                  <a:schemeClr val="tx1"/>
+                </a:solidFill>
+              </a:rPr>
+              <a:t> </a:t>
+            </a:r>
+            <a:r>
+              <a:rPr lang="es-ES" dirty="0" err="1">
+                <a:solidFill>
+                  <a:schemeClr val="tx1"/>
+                </a:solidFill>
+              </a:rPr>
+              <a:t>the</a:t>
+            </a:r>
+            <a:r>
+              <a:rPr lang="es-ES" dirty="0">
+                <a:solidFill>
+                  <a:schemeClr val="tx1"/>
+                </a:solidFill>
+              </a:rPr>
+              <a:t> </a:t>
+            </a:r>
+            <a:r>
+              <a:rPr lang="es-ES" dirty="0" err="1">
+                <a:solidFill>
+                  <a:schemeClr val="tx1"/>
+                </a:solidFill>
+              </a:rPr>
+              <a:t>way</a:t>
+            </a:r>
+            <a:r>
+              <a:rPr lang="es-ES" dirty="0">
+                <a:solidFill>
+                  <a:schemeClr val="tx1"/>
+                </a:solidFill>
+              </a:rPr>
+              <a:t> </a:t>
+            </a:r>
+            <a:r>
+              <a:rPr lang="es-ES" dirty="0" err="1">
+                <a:solidFill>
+                  <a:schemeClr val="tx1"/>
+                </a:solidFill>
+              </a:rPr>
+              <a:t>of</a:t>
+            </a:r>
+            <a:r>
+              <a:rPr lang="es-ES" dirty="0">
+                <a:solidFill>
+                  <a:schemeClr val="tx1"/>
+                </a:solidFill>
+              </a:rPr>
+              <a:t> </a:t>
+            </a:r>
+            <a:r>
+              <a:rPr lang="es-ES" dirty="0" err="1">
+                <a:solidFill>
+                  <a:schemeClr val="tx1"/>
+                </a:solidFill>
+              </a:rPr>
+              <a:t>listening</a:t>
+            </a:r>
+            <a:r>
+              <a:rPr lang="es-ES" dirty="0">
+                <a:solidFill>
+                  <a:schemeClr val="tx1"/>
+                </a:solidFill>
+              </a:rPr>
+              <a:t> </a:t>
+            </a:r>
+            <a:r>
+              <a:rPr lang="es-ES" dirty="0" err="1">
+                <a:solidFill>
+                  <a:schemeClr val="tx1"/>
+                </a:solidFill>
+              </a:rPr>
+              <a:t>to</a:t>
+            </a:r>
+            <a:r>
+              <a:rPr lang="es-ES" dirty="0">
+                <a:solidFill>
+                  <a:schemeClr val="tx1"/>
+                </a:solidFill>
+              </a:rPr>
+              <a:t> music in pubs, </a:t>
+            </a:r>
+            <a:r>
+              <a:rPr lang="es-ES" dirty="0" err="1">
+                <a:solidFill>
+                  <a:schemeClr val="tx1"/>
+                </a:solidFill>
+              </a:rPr>
+              <a:t>giving</a:t>
+            </a:r>
+            <a:r>
+              <a:rPr lang="es-ES" dirty="0">
+                <a:solidFill>
+                  <a:schemeClr val="tx1"/>
+                </a:solidFill>
+              </a:rPr>
+              <a:t> </a:t>
+            </a:r>
+            <a:r>
+              <a:rPr lang="es-ES" dirty="0" err="1">
+                <a:solidFill>
+                  <a:schemeClr val="tx1"/>
+                </a:solidFill>
+              </a:rPr>
+              <a:t>the</a:t>
+            </a:r>
+            <a:r>
+              <a:rPr lang="es-ES" dirty="0">
+                <a:solidFill>
+                  <a:schemeClr val="tx1"/>
+                </a:solidFill>
+              </a:rPr>
+              <a:t> </a:t>
+            </a:r>
+            <a:r>
+              <a:rPr lang="es-ES" dirty="0" err="1">
+                <a:solidFill>
+                  <a:schemeClr val="tx1"/>
+                </a:solidFill>
+              </a:rPr>
+              <a:t>clients</a:t>
+            </a:r>
+            <a:r>
+              <a:rPr lang="es-ES" dirty="0">
+                <a:solidFill>
+                  <a:schemeClr val="tx1"/>
+                </a:solidFill>
+              </a:rPr>
+              <a:t> </a:t>
+            </a:r>
+            <a:r>
+              <a:rPr lang="es-ES" dirty="0" err="1">
+                <a:solidFill>
+                  <a:schemeClr val="tx1"/>
+                </a:solidFill>
+              </a:rPr>
+              <a:t>the</a:t>
+            </a:r>
+            <a:r>
+              <a:rPr lang="es-ES" dirty="0">
+                <a:solidFill>
+                  <a:schemeClr val="tx1"/>
+                </a:solidFill>
+              </a:rPr>
+              <a:t> </a:t>
+            </a:r>
+            <a:r>
+              <a:rPr lang="es-ES" dirty="0" err="1">
+                <a:solidFill>
+                  <a:schemeClr val="tx1"/>
+                </a:solidFill>
+              </a:rPr>
+              <a:t>abilty</a:t>
+            </a:r>
+            <a:r>
+              <a:rPr lang="es-ES" dirty="0">
+                <a:solidFill>
+                  <a:schemeClr val="tx1"/>
+                </a:solidFill>
+              </a:rPr>
+              <a:t> </a:t>
+            </a:r>
+            <a:r>
+              <a:rPr lang="es-ES" dirty="0" err="1">
+                <a:solidFill>
+                  <a:schemeClr val="tx1"/>
+                </a:solidFill>
+              </a:rPr>
+              <a:t>to</a:t>
+            </a:r>
+            <a:r>
+              <a:rPr lang="es-ES" dirty="0">
+                <a:solidFill>
+                  <a:schemeClr val="tx1"/>
+                </a:solidFill>
+              </a:rPr>
+              <a:t> </a:t>
+            </a:r>
+            <a:r>
+              <a:rPr lang="es-ES" dirty="0" err="1">
+                <a:solidFill>
+                  <a:schemeClr val="tx1"/>
+                </a:solidFill>
+              </a:rPr>
+              <a:t>interact</a:t>
+            </a:r>
+            <a:r>
+              <a:rPr lang="es-ES" dirty="0">
+                <a:solidFill>
+                  <a:schemeClr val="tx1"/>
+                </a:solidFill>
+              </a:rPr>
+              <a:t> </a:t>
+            </a:r>
+            <a:r>
+              <a:rPr lang="es-ES" dirty="0" err="1">
+                <a:solidFill>
+                  <a:schemeClr val="tx1"/>
+                </a:solidFill>
+              </a:rPr>
+              <a:t>with</a:t>
+            </a:r>
+            <a:r>
+              <a:rPr lang="es-ES" dirty="0">
+                <a:solidFill>
+                  <a:schemeClr val="tx1"/>
+                </a:solidFill>
+              </a:rPr>
+              <a:t> </a:t>
+            </a:r>
+            <a:r>
+              <a:rPr lang="es-ES" dirty="0" err="1">
+                <a:solidFill>
+                  <a:schemeClr val="tx1"/>
+                </a:solidFill>
+              </a:rPr>
+              <a:t>the</a:t>
+            </a:r>
+            <a:r>
+              <a:rPr lang="es-ES" dirty="0">
+                <a:solidFill>
+                  <a:schemeClr val="tx1"/>
+                </a:solidFill>
+              </a:rPr>
+              <a:t> </a:t>
+            </a:r>
+            <a:r>
+              <a:rPr lang="es-ES" dirty="0" err="1">
+                <a:solidFill>
+                  <a:schemeClr val="tx1"/>
+                </a:solidFill>
+              </a:rPr>
+              <a:t>playlists</a:t>
+            </a:r>
+            <a:r>
+              <a:rPr lang="es-ES" dirty="0">
+                <a:solidFill>
+                  <a:schemeClr val="tx1"/>
+                </a:solidFill>
+              </a:rPr>
+              <a:t> in real time </a:t>
+            </a:r>
+            <a:r>
+              <a:rPr lang="es-ES" dirty="0" err="1">
+                <a:solidFill>
+                  <a:schemeClr val="tx1"/>
+                </a:solidFill>
+              </a:rPr>
+              <a:t>using</a:t>
+            </a:r>
+            <a:r>
+              <a:rPr lang="es-ES" dirty="0">
+                <a:solidFill>
+                  <a:schemeClr val="tx1"/>
+                </a:solidFill>
+              </a:rPr>
+              <a:t> </a:t>
+            </a:r>
+            <a:r>
+              <a:rPr lang="es-ES" dirty="0" err="1">
+                <a:solidFill>
+                  <a:schemeClr val="tx1"/>
+                </a:solidFill>
+              </a:rPr>
+              <a:t>the</a:t>
+            </a:r>
+            <a:r>
+              <a:rPr lang="es-ES" dirty="0">
+                <a:solidFill>
+                  <a:schemeClr val="tx1"/>
+                </a:solidFill>
+              </a:rPr>
+              <a:t> Spotify API.</a:t>
+            </a:r>
+          </a:p>
+          <a:p>
+            <a:r>
+              <a:rPr lang="es-ES" dirty="0" err="1">
+                <a:solidFill>
+                  <a:schemeClr val="tx1"/>
+                </a:solidFill>
+              </a:rPr>
+              <a:t>By</a:t>
+            </a:r>
+            <a:r>
+              <a:rPr lang="es-ES" dirty="0">
+                <a:solidFill>
+                  <a:schemeClr val="tx1"/>
+                </a:solidFill>
+              </a:rPr>
+              <a:t> </a:t>
+            </a:r>
+            <a:r>
+              <a:rPr lang="es-ES" dirty="0" err="1">
+                <a:solidFill>
+                  <a:schemeClr val="tx1"/>
+                </a:solidFill>
+              </a:rPr>
+              <a:t>mapping</a:t>
+            </a:r>
+            <a:r>
+              <a:rPr lang="es-ES" dirty="0">
+                <a:solidFill>
+                  <a:schemeClr val="tx1"/>
+                </a:solidFill>
+              </a:rPr>
+              <a:t> </a:t>
+            </a:r>
+            <a:r>
+              <a:rPr lang="es-ES" dirty="0" err="1">
+                <a:solidFill>
+                  <a:schemeClr val="tx1"/>
+                </a:solidFill>
+              </a:rPr>
+              <a:t>the</a:t>
+            </a:r>
+            <a:r>
+              <a:rPr lang="es-ES" dirty="0">
+                <a:solidFill>
+                  <a:schemeClr val="tx1"/>
+                </a:solidFill>
+              </a:rPr>
+              <a:t> </a:t>
+            </a:r>
+            <a:r>
+              <a:rPr lang="es-ES" dirty="0" err="1">
+                <a:solidFill>
+                  <a:schemeClr val="tx1"/>
+                </a:solidFill>
+              </a:rPr>
+              <a:t>venues</a:t>
+            </a:r>
+            <a:r>
+              <a:rPr lang="es-ES" dirty="0">
+                <a:solidFill>
+                  <a:schemeClr val="tx1"/>
+                </a:solidFill>
+              </a:rPr>
+              <a:t> and </a:t>
+            </a:r>
+            <a:r>
+              <a:rPr lang="es-ES" dirty="0" err="1">
+                <a:solidFill>
+                  <a:schemeClr val="tx1"/>
+                </a:solidFill>
+              </a:rPr>
+              <a:t>giving</a:t>
+            </a:r>
+            <a:r>
+              <a:rPr lang="es-ES" dirty="0">
+                <a:solidFill>
+                  <a:schemeClr val="tx1"/>
+                </a:solidFill>
+              </a:rPr>
+              <a:t> </a:t>
+            </a:r>
+            <a:r>
+              <a:rPr lang="es-ES" dirty="0" err="1">
+                <a:solidFill>
+                  <a:schemeClr val="tx1"/>
+                </a:solidFill>
+              </a:rPr>
+              <a:t>information</a:t>
+            </a:r>
+            <a:r>
+              <a:rPr lang="es-ES" dirty="0">
+                <a:solidFill>
+                  <a:schemeClr val="tx1"/>
+                </a:solidFill>
+              </a:rPr>
+              <a:t> </a:t>
+            </a:r>
+            <a:r>
+              <a:rPr lang="es-ES" dirty="0" err="1">
+                <a:solidFill>
+                  <a:schemeClr val="tx1"/>
+                </a:solidFill>
+              </a:rPr>
+              <a:t>such</a:t>
+            </a:r>
+            <a:r>
+              <a:rPr lang="es-ES" dirty="0">
+                <a:solidFill>
+                  <a:schemeClr val="tx1"/>
+                </a:solidFill>
+              </a:rPr>
+              <a:t> as </a:t>
+            </a:r>
+            <a:r>
+              <a:rPr lang="es-ES" dirty="0" err="1">
+                <a:solidFill>
+                  <a:schemeClr val="tx1"/>
+                </a:solidFill>
+              </a:rPr>
+              <a:t>ongoing</a:t>
+            </a:r>
+            <a:r>
+              <a:rPr lang="es-ES" dirty="0">
+                <a:solidFill>
+                  <a:schemeClr val="tx1"/>
+                </a:solidFill>
+              </a:rPr>
+              <a:t> </a:t>
+            </a:r>
+            <a:r>
+              <a:rPr lang="es-ES" dirty="0" err="1">
+                <a:solidFill>
+                  <a:schemeClr val="tx1"/>
+                </a:solidFill>
+              </a:rPr>
+              <a:t>events</a:t>
+            </a:r>
+            <a:r>
+              <a:rPr lang="es-ES" dirty="0">
+                <a:solidFill>
+                  <a:schemeClr val="tx1"/>
+                </a:solidFill>
+              </a:rPr>
+              <a:t> </a:t>
+            </a:r>
+            <a:r>
+              <a:rPr lang="es-ES" dirty="0" err="1">
+                <a:solidFill>
+                  <a:schemeClr val="tx1"/>
+                </a:solidFill>
+              </a:rPr>
+              <a:t>or</a:t>
+            </a:r>
+            <a:r>
+              <a:rPr lang="es-ES" dirty="0">
+                <a:solidFill>
+                  <a:schemeClr val="tx1"/>
+                </a:solidFill>
+              </a:rPr>
+              <a:t> </a:t>
+            </a:r>
+            <a:r>
+              <a:rPr lang="es-ES" dirty="0" err="1">
+                <a:solidFill>
+                  <a:schemeClr val="tx1"/>
+                </a:solidFill>
+              </a:rPr>
+              <a:t>the</a:t>
+            </a:r>
+            <a:r>
+              <a:rPr lang="es-ES" dirty="0">
+                <a:solidFill>
+                  <a:schemeClr val="tx1"/>
+                </a:solidFill>
+              </a:rPr>
+              <a:t> </a:t>
+            </a:r>
+            <a:r>
+              <a:rPr lang="es-ES" dirty="0" err="1">
+                <a:solidFill>
+                  <a:schemeClr val="tx1"/>
+                </a:solidFill>
+              </a:rPr>
+              <a:t>type</a:t>
+            </a:r>
+            <a:r>
+              <a:rPr lang="es-ES" dirty="0">
+                <a:solidFill>
+                  <a:schemeClr val="tx1"/>
+                </a:solidFill>
+              </a:rPr>
+              <a:t> </a:t>
+            </a:r>
+            <a:r>
+              <a:rPr lang="es-ES" dirty="0" err="1">
+                <a:solidFill>
+                  <a:schemeClr val="tx1"/>
+                </a:solidFill>
+              </a:rPr>
+              <a:t>of</a:t>
+            </a:r>
+            <a:r>
+              <a:rPr lang="es-ES" dirty="0">
+                <a:solidFill>
+                  <a:schemeClr val="tx1"/>
+                </a:solidFill>
+              </a:rPr>
+              <a:t> music </a:t>
+            </a:r>
+            <a:r>
+              <a:rPr lang="es-ES" dirty="0" err="1">
+                <a:solidFill>
+                  <a:schemeClr val="tx1"/>
+                </a:solidFill>
+              </a:rPr>
+              <a:t>that</a:t>
+            </a:r>
+            <a:r>
+              <a:rPr lang="es-ES" dirty="0">
+                <a:solidFill>
+                  <a:schemeClr val="tx1"/>
+                </a:solidFill>
+              </a:rPr>
+              <a:t> </a:t>
+            </a:r>
+            <a:r>
+              <a:rPr lang="es-ES" dirty="0" err="1">
+                <a:solidFill>
+                  <a:schemeClr val="tx1"/>
+                </a:solidFill>
+              </a:rPr>
+              <a:t>is</a:t>
+            </a:r>
+            <a:r>
+              <a:rPr lang="es-ES" dirty="0">
+                <a:solidFill>
+                  <a:schemeClr val="tx1"/>
+                </a:solidFill>
+              </a:rPr>
+              <a:t> </a:t>
+            </a:r>
+            <a:r>
+              <a:rPr lang="es-ES" dirty="0" err="1">
+                <a:solidFill>
+                  <a:schemeClr val="tx1"/>
+                </a:solidFill>
+              </a:rPr>
+              <a:t>being</a:t>
+            </a:r>
+            <a:r>
+              <a:rPr lang="es-ES" dirty="0">
+                <a:solidFill>
+                  <a:schemeClr val="tx1"/>
+                </a:solidFill>
+              </a:rPr>
+              <a:t> </a:t>
+            </a:r>
+            <a:r>
+              <a:rPr lang="es-ES" dirty="0" err="1">
+                <a:solidFill>
+                  <a:schemeClr val="tx1"/>
+                </a:solidFill>
+              </a:rPr>
+              <a:t>played</a:t>
+            </a:r>
+            <a:r>
+              <a:rPr lang="es-ES" dirty="0">
+                <a:solidFill>
+                  <a:schemeClr val="tx1"/>
+                </a:solidFill>
+              </a:rPr>
+              <a:t>, </a:t>
+            </a:r>
+            <a:r>
+              <a:rPr lang="es-ES" dirty="0" err="1">
+                <a:solidFill>
+                  <a:schemeClr val="tx1"/>
+                </a:solidFill>
+              </a:rPr>
+              <a:t>the</a:t>
+            </a:r>
+            <a:r>
+              <a:rPr lang="es-ES" dirty="0">
+                <a:solidFill>
+                  <a:schemeClr val="tx1"/>
+                </a:solidFill>
+              </a:rPr>
+              <a:t> </a:t>
+            </a:r>
+            <a:r>
+              <a:rPr lang="es-ES" dirty="0" err="1">
+                <a:solidFill>
+                  <a:schemeClr val="tx1"/>
+                </a:solidFill>
+              </a:rPr>
+              <a:t>consumer</a:t>
+            </a:r>
+            <a:r>
+              <a:rPr lang="es-ES" dirty="0">
+                <a:solidFill>
+                  <a:schemeClr val="tx1"/>
+                </a:solidFill>
+              </a:rPr>
+              <a:t> </a:t>
+            </a:r>
+            <a:r>
+              <a:rPr lang="es-ES" dirty="0" err="1">
+                <a:solidFill>
+                  <a:schemeClr val="tx1"/>
+                </a:solidFill>
+              </a:rPr>
+              <a:t>will</a:t>
+            </a:r>
+            <a:r>
+              <a:rPr lang="es-ES" dirty="0">
+                <a:solidFill>
+                  <a:schemeClr val="tx1"/>
+                </a:solidFill>
+              </a:rPr>
+              <a:t> </a:t>
+            </a:r>
+            <a:r>
+              <a:rPr lang="es-ES" dirty="0" err="1">
+                <a:solidFill>
+                  <a:schemeClr val="tx1"/>
+                </a:solidFill>
+              </a:rPr>
+              <a:t>have</a:t>
+            </a:r>
+            <a:r>
+              <a:rPr lang="es-ES" dirty="0">
+                <a:solidFill>
+                  <a:schemeClr val="tx1"/>
+                </a:solidFill>
+              </a:rPr>
+              <a:t> </a:t>
+            </a:r>
+            <a:r>
+              <a:rPr lang="es-ES" dirty="0" err="1">
+                <a:solidFill>
+                  <a:schemeClr val="tx1"/>
+                </a:solidFill>
+              </a:rPr>
+              <a:t>an</a:t>
+            </a:r>
+            <a:r>
+              <a:rPr lang="es-ES" dirty="0">
+                <a:solidFill>
+                  <a:schemeClr val="tx1"/>
+                </a:solidFill>
+              </a:rPr>
+              <a:t> </a:t>
+            </a:r>
+            <a:r>
+              <a:rPr lang="es-ES" dirty="0" err="1">
+                <a:solidFill>
+                  <a:schemeClr val="tx1"/>
+                </a:solidFill>
+              </a:rPr>
+              <a:t>easier</a:t>
+            </a:r>
+            <a:r>
+              <a:rPr lang="es-ES" dirty="0">
+                <a:solidFill>
+                  <a:schemeClr val="tx1"/>
+                </a:solidFill>
+              </a:rPr>
+              <a:t> time </a:t>
+            </a:r>
+            <a:r>
+              <a:rPr lang="es-ES" dirty="0" err="1">
+                <a:solidFill>
+                  <a:schemeClr val="tx1"/>
+                </a:solidFill>
+              </a:rPr>
+              <a:t>deciding</a:t>
+            </a:r>
+            <a:r>
+              <a:rPr lang="es-ES" dirty="0">
+                <a:solidFill>
+                  <a:schemeClr val="tx1"/>
+                </a:solidFill>
+              </a:rPr>
+              <a:t> </a:t>
+            </a:r>
+            <a:r>
+              <a:rPr lang="es-ES" dirty="0" err="1">
+                <a:solidFill>
+                  <a:schemeClr val="tx1"/>
+                </a:solidFill>
+              </a:rPr>
+              <a:t>where</a:t>
+            </a:r>
+            <a:r>
+              <a:rPr lang="es-ES" dirty="0">
+                <a:solidFill>
+                  <a:schemeClr val="tx1"/>
+                </a:solidFill>
+              </a:rPr>
+              <a:t> </a:t>
+            </a:r>
+            <a:r>
+              <a:rPr lang="es-ES" dirty="0" err="1">
+                <a:solidFill>
+                  <a:schemeClr val="tx1"/>
+                </a:solidFill>
+              </a:rPr>
+              <a:t>to</a:t>
+            </a:r>
+            <a:r>
+              <a:rPr lang="es-ES" dirty="0">
+                <a:solidFill>
+                  <a:schemeClr val="tx1"/>
+                </a:solidFill>
+              </a:rPr>
+              <a:t> </a:t>
+            </a:r>
+            <a:r>
+              <a:rPr lang="es-ES" dirty="0" err="1">
+                <a:solidFill>
+                  <a:schemeClr val="tx1"/>
+                </a:solidFill>
+              </a:rPr>
+              <a:t>go</a:t>
+            </a:r>
+            <a:r>
+              <a:rPr lang="es-ES" dirty="0">
+                <a:solidFill>
+                  <a:schemeClr val="tx1"/>
+                </a:solidFill>
+              </a:rPr>
+              <a:t>.</a:t>
+            </a:r>
+          </a:p>
+          <a:p>
+            <a:r>
+              <a:rPr lang="es-ES" dirty="0" err="1">
+                <a:solidFill>
+                  <a:schemeClr val="tx1"/>
+                </a:solidFill>
+              </a:rPr>
+              <a:t>Benefits</a:t>
+            </a:r>
+            <a:r>
+              <a:rPr lang="es-ES" dirty="0">
+                <a:solidFill>
+                  <a:schemeClr val="tx1"/>
+                </a:solidFill>
+              </a:rPr>
+              <a:t> </a:t>
+            </a:r>
+            <a:r>
+              <a:rPr lang="es-ES" dirty="0" err="1">
+                <a:solidFill>
+                  <a:schemeClr val="tx1"/>
+                </a:solidFill>
+              </a:rPr>
+              <a:t>for</a:t>
+            </a:r>
+            <a:r>
+              <a:rPr lang="es-ES" dirty="0">
+                <a:solidFill>
+                  <a:schemeClr val="tx1"/>
+                </a:solidFill>
+              </a:rPr>
+              <a:t> </a:t>
+            </a:r>
+            <a:r>
+              <a:rPr lang="es-ES" dirty="0" err="1">
+                <a:solidFill>
+                  <a:schemeClr val="tx1"/>
+                </a:solidFill>
+              </a:rPr>
+              <a:t>the</a:t>
+            </a:r>
+            <a:r>
+              <a:rPr lang="es-ES" dirty="0">
+                <a:solidFill>
+                  <a:schemeClr val="tx1"/>
+                </a:solidFill>
+              </a:rPr>
+              <a:t> </a:t>
+            </a:r>
+            <a:r>
+              <a:rPr lang="es-ES" dirty="0" err="1">
+                <a:solidFill>
+                  <a:schemeClr val="tx1"/>
+                </a:solidFill>
+              </a:rPr>
+              <a:t>owners</a:t>
+            </a:r>
+            <a:r>
+              <a:rPr lang="es-ES" dirty="0">
+                <a:solidFill>
+                  <a:schemeClr val="tx1"/>
+                </a:solidFill>
+              </a:rPr>
+              <a:t> </a:t>
+            </a:r>
+            <a:r>
+              <a:rPr lang="es-ES" dirty="0" err="1">
+                <a:solidFill>
+                  <a:schemeClr val="tx1"/>
+                </a:solidFill>
+              </a:rPr>
+              <a:t>such</a:t>
+            </a:r>
+            <a:r>
+              <a:rPr lang="es-ES" dirty="0">
+                <a:solidFill>
+                  <a:schemeClr val="tx1"/>
+                </a:solidFill>
+              </a:rPr>
+              <a:t> as </a:t>
+            </a:r>
+            <a:r>
+              <a:rPr lang="es-ES" dirty="0" err="1">
+                <a:solidFill>
+                  <a:schemeClr val="tx1"/>
+                </a:solidFill>
+              </a:rPr>
+              <a:t>not</a:t>
+            </a:r>
+            <a:r>
+              <a:rPr lang="es-ES" dirty="0">
+                <a:solidFill>
+                  <a:schemeClr val="tx1"/>
+                </a:solidFill>
+              </a:rPr>
+              <a:t> </a:t>
+            </a:r>
+            <a:r>
+              <a:rPr lang="es-ES" dirty="0" err="1">
+                <a:solidFill>
+                  <a:schemeClr val="tx1"/>
+                </a:solidFill>
+              </a:rPr>
+              <a:t>needing</a:t>
+            </a:r>
+            <a:r>
+              <a:rPr lang="es-ES" dirty="0">
+                <a:solidFill>
+                  <a:schemeClr val="tx1"/>
+                </a:solidFill>
+              </a:rPr>
+              <a:t> a DJ and </a:t>
+            </a:r>
+            <a:r>
+              <a:rPr lang="es-ES" dirty="0" err="1">
+                <a:solidFill>
+                  <a:schemeClr val="tx1"/>
+                </a:solidFill>
+              </a:rPr>
+              <a:t>increased</a:t>
+            </a:r>
+            <a:r>
+              <a:rPr lang="es-ES" dirty="0">
+                <a:solidFill>
+                  <a:schemeClr val="tx1"/>
+                </a:solidFill>
+              </a:rPr>
+              <a:t> </a:t>
+            </a:r>
+            <a:r>
+              <a:rPr lang="es-ES" dirty="0" err="1">
+                <a:solidFill>
+                  <a:schemeClr val="tx1"/>
+                </a:solidFill>
+              </a:rPr>
+              <a:t>exposure</a:t>
+            </a:r>
+            <a:r>
+              <a:rPr lang="es-ES" dirty="0">
+                <a:solidFill>
+                  <a:schemeClr val="tx1"/>
+                </a:solidFill>
+              </a:rPr>
+              <a:t> </a:t>
+            </a:r>
+            <a:r>
+              <a:rPr lang="es-ES" dirty="0" err="1">
+                <a:solidFill>
+                  <a:schemeClr val="tx1"/>
+                </a:solidFill>
+              </a:rPr>
+              <a:t>thanks</a:t>
+            </a:r>
+            <a:r>
+              <a:rPr lang="es-ES" dirty="0">
+                <a:solidFill>
+                  <a:schemeClr val="tx1"/>
+                </a:solidFill>
+              </a:rPr>
+              <a:t> </a:t>
+            </a:r>
+            <a:r>
+              <a:rPr lang="es-ES" dirty="0" err="1">
+                <a:solidFill>
+                  <a:schemeClr val="tx1"/>
+                </a:solidFill>
+              </a:rPr>
+              <a:t>to</a:t>
+            </a:r>
+            <a:r>
+              <a:rPr lang="es-ES" dirty="0">
+                <a:solidFill>
+                  <a:schemeClr val="tx1"/>
+                </a:solidFill>
+              </a:rPr>
+              <a:t> </a:t>
+            </a:r>
+            <a:r>
+              <a:rPr lang="es-ES" dirty="0" err="1">
+                <a:solidFill>
+                  <a:schemeClr val="tx1"/>
+                </a:solidFill>
+              </a:rPr>
+              <a:t>our</a:t>
+            </a:r>
+            <a:r>
+              <a:rPr lang="es-ES" dirty="0">
+                <a:solidFill>
+                  <a:schemeClr val="tx1"/>
+                </a:solidFill>
+              </a:rPr>
+              <a:t> app.</a:t>
+            </a:r>
+          </a:p>
+          <a:p>
+            <a:r>
+              <a:rPr lang="es-ES" dirty="0">
+                <a:solidFill>
+                  <a:schemeClr val="tx1"/>
+                </a:solidFill>
+              </a:rPr>
+              <a:t>Mobile app  in </a:t>
+            </a:r>
+            <a:r>
+              <a:rPr lang="es-ES" dirty="0" err="1">
+                <a:solidFill>
+                  <a:schemeClr val="tx1"/>
+                </a:solidFill>
+              </a:rPr>
+              <a:t>order</a:t>
+            </a:r>
+            <a:r>
+              <a:rPr lang="es-ES" dirty="0">
+                <a:solidFill>
+                  <a:schemeClr val="tx1"/>
+                </a:solidFill>
+              </a:rPr>
+              <a:t> </a:t>
+            </a:r>
+            <a:r>
+              <a:rPr lang="es-ES" dirty="0" err="1">
+                <a:solidFill>
+                  <a:schemeClr val="tx1"/>
+                </a:solidFill>
+              </a:rPr>
+              <a:t>to</a:t>
+            </a:r>
+            <a:r>
+              <a:rPr lang="es-ES" dirty="0">
+                <a:solidFill>
+                  <a:schemeClr val="tx1"/>
+                </a:solidFill>
+              </a:rPr>
+              <a:t> </a:t>
+            </a:r>
+            <a:r>
+              <a:rPr lang="es-ES" dirty="0" err="1">
+                <a:solidFill>
+                  <a:schemeClr val="tx1"/>
+                </a:solidFill>
+              </a:rPr>
+              <a:t>make</a:t>
+            </a:r>
+            <a:r>
+              <a:rPr lang="es-ES" dirty="0">
+                <a:solidFill>
+                  <a:schemeClr val="tx1"/>
+                </a:solidFill>
+              </a:rPr>
+              <a:t> </a:t>
+            </a:r>
+            <a:r>
+              <a:rPr lang="es-ES" dirty="0" err="1">
+                <a:solidFill>
+                  <a:schemeClr val="tx1"/>
+                </a:solidFill>
+              </a:rPr>
+              <a:t>the</a:t>
+            </a:r>
+            <a:r>
+              <a:rPr lang="es-ES" dirty="0">
+                <a:solidFill>
+                  <a:schemeClr val="tx1"/>
+                </a:solidFill>
+              </a:rPr>
+              <a:t> </a:t>
+            </a:r>
+            <a:r>
+              <a:rPr lang="es-ES" dirty="0" err="1">
+                <a:solidFill>
+                  <a:schemeClr val="tx1"/>
+                </a:solidFill>
+              </a:rPr>
+              <a:t>user</a:t>
+            </a:r>
+            <a:r>
+              <a:rPr lang="es-ES" dirty="0">
+                <a:solidFill>
+                  <a:schemeClr val="tx1"/>
+                </a:solidFill>
+              </a:rPr>
+              <a:t> </a:t>
+            </a:r>
+            <a:r>
+              <a:rPr lang="es-ES" dirty="0" err="1">
+                <a:solidFill>
+                  <a:schemeClr val="tx1"/>
+                </a:solidFill>
+              </a:rPr>
+              <a:t>experience</a:t>
+            </a:r>
+            <a:r>
+              <a:rPr lang="es-ES" dirty="0">
+                <a:solidFill>
+                  <a:schemeClr val="tx1"/>
+                </a:solidFill>
+              </a:rPr>
+              <a:t> as </a:t>
+            </a:r>
+            <a:r>
+              <a:rPr lang="es-ES" dirty="0" err="1">
+                <a:solidFill>
+                  <a:schemeClr val="tx1"/>
+                </a:solidFill>
+              </a:rPr>
+              <a:t>smooth</a:t>
+            </a:r>
+            <a:r>
+              <a:rPr lang="es-ES" dirty="0">
+                <a:solidFill>
+                  <a:schemeClr val="tx1"/>
+                </a:solidFill>
+              </a:rPr>
+              <a:t> as posible.</a:t>
+            </a:r>
+          </a:p>
+          <a:p>
+            <a:endParaRPr lang="es-ES" dirty="0"/>
+          </a:p>
+        </p:txBody>
+      </p:sp>
+      <p:pic>
+        <p:nvPicPr>
+          <p:cNvPr id="5" name="Imagen 4">
+            <a:extLst>
+              <a:ext uri="{FF2B5EF4-FFF2-40B4-BE49-F238E27FC236}">
+                <a16:creationId xmlns:a16="http://schemas.microsoft.com/office/drawing/2014/main" id="{C7780452-7FC7-46C7-AF07-D8B8121CE75E}"/>
+              </a:ext>
+            </a:extLst>
+          </p:cNvPr>
+          <p:cNvPicPr>
+            <a:picLocks noChangeAspect="1"/>
+          </p:cNvPicPr>
+          <p:nvPr/>
+        </p:nvPicPr>
+        <p:blipFill>
+          <a:blip r:embed="rId2">
+            <a:extLst>
+              <a:ext uri="{28A0092B-C50C-407E-A947-70E740481C1C}">
+                <a14:useLocalDpi xmlns:a14="http://schemas.microsoft.com/office/drawing/2010/main" val="0"/>
+              </a:ext>
+            </a:extLst>
+          </a:blip>
+          <a:stretch>
+            <a:fillRect/>
+          </a:stretch>
+        </p:blipFill>
+        <p:spPr>
+          <a:xfrm>
+            <a:off x="9168527" y="2903580"/>
+            <a:ext cx="3023473" cy="3268620"/>
+          </a:xfrm>
+          <a:prstGeom prst="rect">
+            <a:avLst/>
+          </a:prstGeom>
+        </p:spPr>
+      </p:pic>
+    </p:spTree>
+    <p:extLst>
+      <p:ext uri="{BB962C8B-B14F-4D97-AF65-F5344CB8AC3E}">
+        <p14:creationId xmlns:p14="http://schemas.microsoft.com/office/powerpoint/2010/main" val="3747163501"/>
+      </p:ext>
+    </p:extLst>
+  </p:cSld>
+  <p:clrMapOvr>
+    <a:masterClrMapping/>
+  </p:clrMapOvr>
+</p:sld>
+</file>
+
+<file path=ppt/slides/slide12.xml><?xml version="1.0" encoding="utf-8"?>
+<p:sld xmlns:a="http://schemas.openxmlformats.org/drawingml/2006/main" xmlns:r="http://schemas.openxmlformats.org/officeDocument/2006/relationships" xmlns:p="http://schemas.openxmlformats.org/presentationml/2006/main">
+  <p:cSld>
+    <p:spTree>
+      <p:nvGrpSpPr>
+        <p:cNvPr id="1" name=""/>
+        <p:cNvGrpSpPr/>
+        <p:nvPr/>
+      </p:nvGrpSpPr>
+      <p:grpSpPr>
+        <a:xfrm>
+          <a:off x="0" y="0"/>
+          <a:ext cx="0" cy="0"/>
+          <a:chOff x="0" y="0"/>
+          <a:chExt cx="0" cy="0"/>
+        </a:xfrm>
+      </p:grpSpPr>
+      <p:sp>
+        <p:nvSpPr>
+          <p:cNvPr id="2" name="Título 1">
+            <a:extLst>
+              <a:ext uri="{FF2B5EF4-FFF2-40B4-BE49-F238E27FC236}">
+                <a16:creationId xmlns:a16="http://schemas.microsoft.com/office/drawing/2014/main" id="{445B603E-5A2D-40D0-A069-499E52FA9FA0}"/>
+              </a:ext>
+            </a:extLst>
+          </p:cNvPr>
+          <p:cNvSpPr>
+            <a:spLocks noGrp="1"/>
+          </p:cNvSpPr>
+          <p:nvPr>
+            <p:ph type="title"/>
+          </p:nvPr>
+        </p:nvSpPr>
+        <p:spPr>
+          <a:xfrm>
+            <a:off x="684212" y="685800"/>
+            <a:ext cx="8534400" cy="1507067"/>
+          </a:xfrm>
+        </p:spPr>
+        <p:txBody>
+          <a:bodyPr/>
+          <a:lstStyle/>
+          <a:p>
+            <a:r>
+              <a:rPr lang="es-ES" dirty="0"/>
+              <a:t>COSTS</a:t>
+            </a:r>
+          </a:p>
+        </p:txBody>
+      </p:sp>
+      <p:pic>
+        <p:nvPicPr>
+          <p:cNvPr id="5" name="Marcador de contenido 4">
+            <a:extLst>
+              <a:ext uri="{FF2B5EF4-FFF2-40B4-BE49-F238E27FC236}">
+                <a16:creationId xmlns:a16="http://schemas.microsoft.com/office/drawing/2014/main" id="{B3E3FBC6-7E81-4E91-AB79-BE7CD2D011A1}"/>
+              </a:ext>
+            </a:extLst>
+          </p:cNvPr>
+          <p:cNvPicPr>
+            <a:picLocks noGrp="1" noChangeAspect="1"/>
+          </p:cNvPicPr>
+          <p:nvPr>
+            <p:ph idx="1"/>
+          </p:nvPr>
+        </p:nvPicPr>
+        <p:blipFill>
+          <a:blip r:embed="rId2">
+            <a:extLst>
+              <a:ext uri="{28A0092B-C50C-407E-A947-70E740481C1C}">
+                <a14:useLocalDpi xmlns:a14="http://schemas.microsoft.com/office/drawing/2010/main" val="0"/>
+              </a:ext>
+            </a:extLst>
+          </a:blip>
+          <a:stretch>
+            <a:fillRect/>
+          </a:stretch>
+        </p:blipFill>
+        <p:spPr>
+          <a:xfrm>
+            <a:off x="684212" y="1811127"/>
+            <a:ext cx="11261560" cy="3995121"/>
+          </a:xfrm>
+        </p:spPr>
+      </p:pic>
     </p:spTree>
     <p:extLst>
       <p:ext uri="{BB962C8B-B14F-4D97-AF65-F5344CB8AC3E}">
         <p14:creationId xmlns:p14="http://schemas.microsoft.com/office/powerpoint/2010/main" val="568545659"/>
+      </p:ext>
+    </p:extLst>
+  </p:cSld>
+  <p:clrMapOvr>
+    <a:masterClrMapping/>
+  </p:clrMapOvr>
+</p:sld>
+</file>
+
+<file path=ppt/slides/slide13.xml><?xml version="1.0" encoding="utf-8"?>
+<p:sld xmlns:a="http://schemas.openxmlformats.org/drawingml/2006/main" xmlns:r="http://schemas.openxmlformats.org/officeDocument/2006/relationships" xmlns:p="http://schemas.openxmlformats.org/presentationml/2006/main">
+  <p:cSld>
+    <p:spTree>
+      <p:nvGrpSpPr>
+        <p:cNvPr id="1" name=""/>
+        <p:cNvGrpSpPr/>
+        <p:nvPr/>
+      </p:nvGrpSpPr>
+      <p:grpSpPr>
+        <a:xfrm>
+          <a:off x="0" y="0"/>
+          <a:ext cx="0" cy="0"/>
+          <a:chOff x="0" y="0"/>
+          <a:chExt cx="0" cy="0"/>
+        </a:xfrm>
+      </p:grpSpPr>
+      <p:sp>
+        <p:nvSpPr>
+          <p:cNvPr id="2" name="Título 1">
+            <a:extLst>
+              <a:ext uri="{FF2B5EF4-FFF2-40B4-BE49-F238E27FC236}">
+                <a16:creationId xmlns:a16="http://schemas.microsoft.com/office/drawing/2014/main" id="{445B603E-5A2D-40D0-A069-499E52FA9FA0}"/>
+              </a:ext>
+            </a:extLst>
+          </p:cNvPr>
+          <p:cNvSpPr>
+            <a:spLocks noGrp="1"/>
+          </p:cNvSpPr>
+          <p:nvPr>
+            <p:ph type="title"/>
+          </p:nvPr>
+        </p:nvSpPr>
+        <p:spPr>
+          <a:xfrm>
+            <a:off x="684212" y="685800"/>
+            <a:ext cx="8534400" cy="1507067"/>
+          </a:xfrm>
+        </p:spPr>
+        <p:txBody>
+          <a:bodyPr/>
+          <a:lstStyle/>
+          <a:p>
+            <a:endParaRPr lang="es-ES" dirty="0"/>
+          </a:p>
+        </p:txBody>
+      </p:sp>
+      <p:sp>
+        <p:nvSpPr>
+          <p:cNvPr id="3" name="Marcador de contenido 2">
+            <a:extLst>
+              <a:ext uri="{FF2B5EF4-FFF2-40B4-BE49-F238E27FC236}">
+                <a16:creationId xmlns:a16="http://schemas.microsoft.com/office/drawing/2014/main" id="{40F8E8B8-0492-4855-AC00-14AD2A173FB8}"/>
+              </a:ext>
+            </a:extLst>
+          </p:cNvPr>
+          <p:cNvSpPr>
+            <a:spLocks noGrp="1"/>
+          </p:cNvSpPr>
+          <p:nvPr>
+            <p:ph idx="1"/>
+          </p:nvPr>
+        </p:nvSpPr>
+        <p:spPr>
+          <a:xfrm>
+            <a:off x="684212" y="1669003"/>
+            <a:ext cx="8534400" cy="4216892"/>
+          </a:xfrm>
+        </p:spPr>
+        <p:txBody>
+          <a:bodyPr>
+            <a:normAutofit/>
+          </a:bodyPr>
+          <a:lstStyle/>
+          <a:p>
+            <a:pPr marL="0" indent="0" algn="ctr">
+              <a:buNone/>
+            </a:pPr>
+            <a:r>
+              <a:rPr lang="es-ES" sz="4800" dirty="0">
+                <a:solidFill>
+                  <a:schemeClr val="tx1"/>
+                </a:solidFill>
+              </a:rPr>
+              <a:t>THANK YOU!</a:t>
+            </a:r>
+          </a:p>
+        </p:txBody>
+      </p:sp>
+    </p:spTree>
+    <p:extLst>
+      <p:ext uri="{BB962C8B-B14F-4D97-AF65-F5344CB8AC3E}">
+        <p14:creationId xmlns:p14="http://schemas.microsoft.com/office/powerpoint/2010/main" val="2750523407"/>
       </p:ext>
     </p:extLst>
   </p:cSld>
@@ -5676,7 +7710,7 @@
         </p:nvSpPr>
         <p:spPr>
           <a:xfrm>
-            <a:off x="701967" y="1933607"/>
+            <a:off x="515537" y="1009670"/>
             <a:ext cx="8534400" cy="3375240"/>
           </a:xfrm>
         </p:spPr>
@@ -6208,6 +8242,42 @@
           </a:p>
         </p:txBody>
       </p:sp>
+      <p:pic>
+        <p:nvPicPr>
+          <p:cNvPr id="4" name="Imagen 3">
+            <a:extLst>
+              <a:ext uri="{FF2B5EF4-FFF2-40B4-BE49-F238E27FC236}">
+                <a16:creationId xmlns:a16="http://schemas.microsoft.com/office/drawing/2014/main" id="{F1A549B0-D972-446D-A088-D365530A66A0}"/>
+              </a:ext>
+            </a:extLst>
+          </p:cNvPr>
+          <p:cNvPicPr>
+            <a:picLocks noChangeAspect="1"/>
+          </p:cNvPicPr>
+          <p:nvPr/>
+        </p:nvPicPr>
+        <p:blipFill>
+          <a:blip r:embed="rId2">
+            <a:extLst>
+              <a:ext uri="{28A0092B-C50C-407E-A947-70E740481C1C}">
+                <a14:useLocalDpi xmlns:a14="http://schemas.microsoft.com/office/drawing/2010/main" val="0"/>
+              </a:ext>
+            </a:extLst>
+          </a:blip>
+          <a:stretch>
+            <a:fillRect/>
+          </a:stretch>
+        </p:blipFill>
+        <p:spPr>
+          <a:xfrm>
+            <a:off x="3435658" y="3808891"/>
+            <a:ext cx="4705165" cy="2940728"/>
+          </a:xfrm>
+          <a:prstGeom prst="rect">
+            <a:avLst/>
+          </a:prstGeom>
+        </p:spPr>
+      </p:pic>
     </p:spTree>
     <p:extLst>
       <p:ext uri="{BB962C8B-B14F-4D97-AF65-F5344CB8AC3E}">
@@ -6293,7 +8363,7 @@
         </p:nvSpPr>
         <p:spPr>
           <a:xfrm>
-            <a:off x="684212" y="1669003"/>
+            <a:off x="684212" y="1633492"/>
             <a:ext cx="8534400" cy="4216892"/>
           </a:xfrm>
         </p:spPr>
@@ -6823,42 +8893,6 @@
           </a:p>
         </p:txBody>
       </p:sp>
-      <p:pic>
-        <p:nvPicPr>
-          <p:cNvPr id="7" name="Marcador de contenido 4">
-            <a:extLst>
-              <a:ext uri="{FF2B5EF4-FFF2-40B4-BE49-F238E27FC236}">
-                <a16:creationId xmlns:a16="http://schemas.microsoft.com/office/drawing/2014/main" id="{A71D7520-D704-4BF5-A7C5-8F9B6469781B}"/>
-              </a:ext>
-            </a:extLst>
-          </p:cNvPr>
-          <p:cNvPicPr>
-            <a:picLocks noChangeAspect="1"/>
-          </p:cNvPicPr>
-          <p:nvPr/>
-        </p:nvPicPr>
-        <p:blipFill>
-          <a:blip r:embed="rId2">
-            <a:extLst>
-              <a:ext uri="{28A0092B-C50C-407E-A947-70E740481C1C}">
-                <a14:useLocalDpi xmlns:a14="http://schemas.microsoft.com/office/drawing/2010/main" val="0"/>
-              </a:ext>
-            </a:extLst>
-          </a:blip>
-          <a:stretch>
-            <a:fillRect/>
-          </a:stretch>
-        </p:blipFill>
-        <p:spPr>
-          <a:xfrm>
-            <a:off x="4469059" y="1908161"/>
-            <a:ext cx="1331612" cy="1331612"/>
-          </a:xfrm>
-          <a:prstGeom prst="rect">
-            <a:avLst/>
-          </a:prstGeom>
-        </p:spPr>
-      </p:pic>
       <p:sp>
         <p:nvSpPr>
           <p:cNvPr id="8" name="CuadroTexto 7">
@@ -6915,42 +8949,6 @@
           </a:p>
         </p:txBody>
       </p:sp>
-      <p:pic>
-        <p:nvPicPr>
-          <p:cNvPr id="9" name="Marcador de contenido 4">
-            <a:extLst>
-              <a:ext uri="{FF2B5EF4-FFF2-40B4-BE49-F238E27FC236}">
-                <a16:creationId xmlns:a16="http://schemas.microsoft.com/office/drawing/2014/main" id="{043E9D32-0E60-4A15-9431-DD60AC85F44B}"/>
-              </a:ext>
-            </a:extLst>
-          </p:cNvPr>
-          <p:cNvPicPr>
-            <a:picLocks noChangeAspect="1"/>
-          </p:cNvPicPr>
-          <p:nvPr/>
-        </p:nvPicPr>
-        <p:blipFill>
-          <a:blip r:embed="rId2">
-            <a:extLst>
-              <a:ext uri="{28A0092B-C50C-407E-A947-70E740481C1C}">
-                <a14:useLocalDpi xmlns:a14="http://schemas.microsoft.com/office/drawing/2010/main" val="0"/>
-              </a:ext>
-            </a:extLst>
-          </a:blip>
-          <a:stretch>
-            <a:fillRect/>
-          </a:stretch>
-        </p:blipFill>
-        <p:spPr>
-          <a:xfrm>
-            <a:off x="8900553" y="1908161"/>
-            <a:ext cx="1331612" cy="1331612"/>
-          </a:xfrm>
-          <a:prstGeom prst="rect">
-            <a:avLst/>
-          </a:prstGeom>
-        </p:spPr>
-      </p:pic>
       <p:sp>
         <p:nvSpPr>
           <p:cNvPr id="10" name="CuadroTexto 9">
@@ -6981,7 +8979,7 @@
           <a:p>
             <a:r>
               <a:rPr lang="es-ES" dirty="0"/>
-              <a:t>Juan Apellido: </a:t>
+              <a:t>Juan Rodríguez: </a:t>
             </a:r>
             <a:r>
               <a:rPr lang="es-ES" dirty="0" err="1"/>
@@ -7015,42 +9013,6 @@
           </a:p>
         </p:txBody>
       </p:sp>
-      <p:pic>
-        <p:nvPicPr>
-          <p:cNvPr id="11" name="Marcador de contenido 4">
-            <a:extLst>
-              <a:ext uri="{FF2B5EF4-FFF2-40B4-BE49-F238E27FC236}">
-                <a16:creationId xmlns:a16="http://schemas.microsoft.com/office/drawing/2014/main" id="{60357CC2-5594-450B-A760-ADD392F62560}"/>
-              </a:ext>
-            </a:extLst>
-          </p:cNvPr>
-          <p:cNvPicPr>
-            <a:picLocks noChangeAspect="1"/>
-          </p:cNvPicPr>
-          <p:nvPr/>
-        </p:nvPicPr>
-        <p:blipFill>
-          <a:blip r:embed="rId2">
-            <a:extLst>
-              <a:ext uri="{28A0092B-C50C-407E-A947-70E740481C1C}">
-                <a14:useLocalDpi xmlns:a14="http://schemas.microsoft.com/office/drawing/2010/main" val="0"/>
-              </a:ext>
-            </a:extLst>
-          </a:blip>
-          <a:stretch>
-            <a:fillRect/>
-          </a:stretch>
-        </p:blipFill>
-        <p:spPr>
-          <a:xfrm>
-            <a:off x="2921997" y="4618114"/>
-            <a:ext cx="1331612" cy="1331612"/>
-          </a:xfrm>
-          <a:prstGeom prst="rect">
-            <a:avLst/>
-          </a:prstGeom>
-        </p:spPr>
-      </p:pic>
       <p:sp>
         <p:nvSpPr>
           <p:cNvPr id="12" name="CuadroTexto 11">
@@ -7194,6 +9156,114 @@
           </a:p>
         </p:txBody>
       </p:sp>
+      <p:pic>
+        <p:nvPicPr>
+          <p:cNvPr id="4" name="Imagen 3">
+            <a:extLst>
+              <a:ext uri="{FF2B5EF4-FFF2-40B4-BE49-F238E27FC236}">
+                <a16:creationId xmlns:a16="http://schemas.microsoft.com/office/drawing/2014/main" id="{130B0580-A2C7-4EF6-A543-8EF392215D71}"/>
+              </a:ext>
+            </a:extLst>
+          </p:cNvPr>
+          <p:cNvPicPr>
+            <a:picLocks noChangeAspect="1"/>
+          </p:cNvPicPr>
+          <p:nvPr/>
+        </p:nvPicPr>
+        <p:blipFill>
+          <a:blip r:embed="rId4">
+            <a:extLst>
+              <a:ext uri="{28A0092B-C50C-407E-A947-70E740481C1C}">
+                <a14:useLocalDpi xmlns:a14="http://schemas.microsoft.com/office/drawing/2010/main" val="0"/>
+              </a:ext>
+            </a:extLst>
+          </a:blip>
+          <a:stretch>
+            <a:fillRect/>
+          </a:stretch>
+        </p:blipFill>
+        <p:spPr>
+          <a:xfrm>
+            <a:off x="4743168" y="1736802"/>
+            <a:ext cx="1178237" cy="1572621"/>
+          </a:xfrm>
+          <a:prstGeom prst="rect">
+            <a:avLst/>
+          </a:prstGeom>
+        </p:spPr>
+      </p:pic>
+      <p:pic>
+        <p:nvPicPr>
+          <p:cNvPr id="16" name="Imagen 15">
+            <a:extLst>
+              <a:ext uri="{FF2B5EF4-FFF2-40B4-BE49-F238E27FC236}">
+                <a16:creationId xmlns:a16="http://schemas.microsoft.com/office/drawing/2014/main" id="{C3BCB1A3-A9DF-40D9-A35F-D350DC0C845E}"/>
+              </a:ext>
+            </a:extLst>
+          </p:cNvPr>
+          <p:cNvPicPr>
+            <a:picLocks noChangeAspect="1"/>
+          </p:cNvPicPr>
+          <p:nvPr/>
+        </p:nvPicPr>
+        <p:blipFill>
+          <a:blip r:embed="rId5">
+            <a:extLst>
+              <a:ext uri="{28A0092B-C50C-407E-A947-70E740481C1C}">
+                <a14:useLocalDpi xmlns:a14="http://schemas.microsoft.com/office/drawing/2010/main" val="0"/>
+              </a:ext>
+            </a:extLst>
+          </a:blip>
+          <a:stretch>
+            <a:fillRect/>
+          </a:stretch>
+        </p:blipFill>
+        <p:spPr>
+          <a:xfrm>
+            <a:off x="2833757" y="4312462"/>
+            <a:ext cx="1551812" cy="1551812"/>
+          </a:xfrm>
+          <a:prstGeom prst="rect">
+            <a:avLst/>
+          </a:prstGeom>
+        </p:spPr>
+      </p:pic>
+      <p:pic>
+        <p:nvPicPr>
+          <p:cNvPr id="18" name="Imagen 17">
+            <a:extLst>
+              <a:ext uri="{FF2B5EF4-FFF2-40B4-BE49-F238E27FC236}">
+                <a16:creationId xmlns:a16="http://schemas.microsoft.com/office/drawing/2014/main" id="{3EB1318E-38EE-49DA-897B-AE782D8599AB}"/>
+              </a:ext>
+            </a:extLst>
+          </p:cNvPr>
+          <p:cNvPicPr>
+            <a:picLocks noChangeAspect="1"/>
+          </p:cNvPicPr>
+          <p:nvPr/>
+        </p:nvPicPr>
+        <p:blipFill>
+          <a:blip r:embed="rId6">
+            <a:extLst>
+              <a:ext uri="{28A0092B-C50C-407E-A947-70E740481C1C}">
+                <a14:useLocalDpi xmlns:a14="http://schemas.microsoft.com/office/drawing/2010/main" val="0"/>
+              </a:ext>
+            </a:extLst>
+          </a:blip>
+          <a:stretch>
+            <a:fillRect/>
+          </a:stretch>
+        </p:blipFill>
+        <p:spPr>
+          <a:xfrm>
+            <a:off x="8847628" y="1736802"/>
+            <a:ext cx="1132734" cy="1635607"/>
+          </a:xfrm>
+          <a:prstGeom prst="rect">
+            <a:avLst/>
+          </a:prstGeom>
+        </p:spPr>
+      </p:pic>
     </p:spTree>
     <p:extLst>
       <p:ext uri="{BB962C8B-B14F-4D97-AF65-F5344CB8AC3E}">
@@ -8611,50 +10681,45 @@
               <a:rPr lang="es-ES" dirty="0" err="1"/>
               <a:t>Mvp</a:t>
             </a:r>
-            <a:r>
-              <a:rPr lang="es-ES" dirty="0"/>
-              <a:t> </a:t>
-            </a:r>
-            <a:r>
-              <a:rPr lang="es-ES" dirty="0" err="1"/>
-              <a:t>placeholder</a:t>
-            </a:r>
             <a:endParaRPr lang="es-ES" dirty="0"/>
           </a:p>
         </p:txBody>
       </p:sp>
-      <p:sp>
-        <p:nvSpPr>
-          <p:cNvPr id="3" name="Marcador de contenido 2">
+      <p:pic>
+        <p:nvPicPr>
+          <p:cNvPr id="5" name="Marcador de contenido 4">
             <a:extLst>
               <a:ext uri="{FF2B5EF4-FFF2-40B4-BE49-F238E27FC236}">
-                <a16:creationId xmlns:a16="http://schemas.microsoft.com/office/drawing/2014/main" id="{40F8E8B8-0492-4855-AC00-14AD2A173FB8}"/>
+                <a16:creationId xmlns:a16="http://schemas.microsoft.com/office/drawing/2014/main" id="{82844D66-220B-4D28-AAAB-D0A061E31982}"/>
               </a:ext>
             </a:extLst>
           </p:cNvPr>
-          <p:cNvSpPr>
-            <a:spLocks noGrp="1"/>
-          </p:cNvSpPr>
+          <p:cNvPicPr>
+            <a:picLocks noGrp="1" noChangeAspect="1"/>
+          </p:cNvPicPr>
           <p:nvPr>
             <p:ph idx="1"/>
           </p:nvPr>
-        </p:nvSpPr>
+        </p:nvPicPr>
+        <p:blipFill>
+          <a:blip r:embed="rId2">
+            <a:extLst>
+              <a:ext uri="{28A0092B-C50C-407E-A947-70E740481C1C}">
+                <a14:useLocalDpi xmlns:a14="http://schemas.microsoft.com/office/drawing/2010/main" val="0"/>
+              </a:ext>
+            </a:extLst>
+          </a:blip>
+          <a:stretch>
+            <a:fillRect/>
+          </a:stretch>
+        </p:blipFill>
         <p:spPr>
           <a:xfrm>
-            <a:off x="684212" y="1669003"/>
-            <a:ext cx="8534400" cy="4216892"/>
+            <a:off x="1855787" y="1781969"/>
+            <a:ext cx="7004127" cy="4514968"/>
           </a:xfrm>
         </p:spPr>
-        <p:txBody>
-          <a:bodyPr>
-            <a:normAutofit/>
-          </a:bodyPr>
-          <a:lstStyle/>
-          <a:p>
-            <a:endParaRPr lang="es-ES" dirty="0"/>
-          </a:p>
-        </p:txBody>
-      </p:sp>
+      </p:pic>
     </p:spTree>
     <p:extLst>
       <p:ext uri="{BB962C8B-B14F-4D97-AF65-F5344CB8AC3E}">
@@ -8873,7 +10938,7 @@
           <a:p>
             <a:r>
               <a:rPr lang="es-ES" dirty="0"/>
-              <a:t>OUR COMPETITORS</a:t>
+              <a:t>SYSTEM STRUCTURE</a:t>
             </a:r>
           </a:p>
         </p:txBody>
@@ -8896,7 +10961,7 @@
         </p:nvSpPr>
         <p:spPr>
           <a:xfrm>
-            <a:off x="684212" y="1669003"/>
+            <a:off x="586556" y="1439333"/>
             <a:ext cx="8534400" cy="4216892"/>
           </a:xfrm>
         </p:spPr>
@@ -8906,17 +10971,210 @@
           </a:bodyPr>
           <a:lstStyle/>
           <a:p>
-            <a:r>
-              <a:rPr lang="es-ES" dirty="0"/>
-              <a:t>play.festa.co</a:t>
-            </a:r>
-          </a:p>
-        </p:txBody>
-      </p:sp>
+            <a:pPr marL="0" indent="0">
+              <a:buNone/>
+            </a:pPr>
+            <a:r>
+              <a:rPr lang="es-ES" dirty="0" err="1">
+                <a:solidFill>
+                  <a:schemeClr val="tx1"/>
+                </a:solidFill>
+              </a:rPr>
+              <a:t>Option</a:t>
+            </a:r>
+            <a:r>
+              <a:rPr lang="es-ES" dirty="0">
+                <a:solidFill>
+                  <a:schemeClr val="tx1"/>
+                </a:solidFill>
+              </a:rPr>
+              <a:t> A: </a:t>
+            </a:r>
+          </a:p>
+          <a:p>
+            <a:r>
+              <a:rPr lang="es-ES" dirty="0">
+                <a:solidFill>
+                  <a:schemeClr val="tx1"/>
+                </a:solidFill>
+              </a:rPr>
+              <a:t>Django app (Python), </a:t>
+            </a:r>
+            <a:r>
+              <a:rPr lang="es-ES" dirty="0" err="1">
+                <a:solidFill>
+                  <a:schemeClr val="tx1"/>
+                </a:solidFill>
+              </a:rPr>
+              <a:t>deployed</a:t>
+            </a:r>
+            <a:r>
+              <a:rPr lang="es-ES" dirty="0">
+                <a:solidFill>
+                  <a:schemeClr val="tx1"/>
+                </a:solidFill>
+              </a:rPr>
+              <a:t> in </a:t>
+            </a:r>
+            <a:r>
+              <a:rPr lang="es-ES" dirty="0" err="1">
+                <a:solidFill>
+                  <a:schemeClr val="tx1"/>
+                </a:solidFill>
+              </a:rPr>
+              <a:t>Heroku</a:t>
+            </a:r>
+            <a:endParaRPr lang="es-ES" dirty="0">
+              <a:solidFill>
+                <a:schemeClr val="tx1"/>
+              </a:solidFill>
+            </a:endParaRPr>
+          </a:p>
+          <a:p>
+            <a:r>
+              <a:rPr lang="es-ES" dirty="0">
+                <a:solidFill>
+                  <a:schemeClr val="tx1"/>
+                </a:solidFill>
+              </a:rPr>
+              <a:t>PostgreSQL </a:t>
+            </a:r>
+            <a:r>
+              <a:rPr lang="es-ES" dirty="0" err="1">
+                <a:solidFill>
+                  <a:schemeClr val="tx1"/>
+                </a:solidFill>
+              </a:rPr>
+              <a:t>database</a:t>
+            </a:r>
+            <a:r>
+              <a:rPr lang="es-ES" dirty="0">
+                <a:solidFill>
+                  <a:schemeClr val="tx1"/>
+                </a:solidFill>
+              </a:rPr>
+              <a:t>, </a:t>
+            </a:r>
+            <a:r>
+              <a:rPr lang="es-ES" dirty="0" err="1">
+                <a:solidFill>
+                  <a:schemeClr val="tx1"/>
+                </a:solidFill>
+              </a:rPr>
+              <a:t>also</a:t>
+            </a:r>
+            <a:r>
+              <a:rPr lang="es-ES" dirty="0">
+                <a:solidFill>
+                  <a:schemeClr val="tx1"/>
+                </a:solidFill>
+              </a:rPr>
+              <a:t> </a:t>
+            </a:r>
+            <a:r>
+              <a:rPr lang="es-ES" dirty="0" err="1">
+                <a:solidFill>
+                  <a:schemeClr val="tx1"/>
+                </a:solidFill>
+              </a:rPr>
+              <a:t>deployed</a:t>
+            </a:r>
+            <a:r>
+              <a:rPr lang="es-ES" dirty="0">
+                <a:solidFill>
+                  <a:schemeClr val="tx1"/>
+                </a:solidFill>
+              </a:rPr>
+              <a:t> in </a:t>
+            </a:r>
+            <a:r>
+              <a:rPr lang="es-ES" dirty="0" err="1">
+                <a:solidFill>
+                  <a:schemeClr val="tx1"/>
+                </a:solidFill>
+              </a:rPr>
+              <a:t>Heroku</a:t>
+            </a:r>
+            <a:endParaRPr lang="es-ES" dirty="0">
+              <a:solidFill>
+                <a:schemeClr val="tx1"/>
+              </a:solidFill>
+            </a:endParaRPr>
+          </a:p>
+          <a:p>
+            <a:r>
+              <a:rPr lang="es-ES" dirty="0">
+                <a:solidFill>
+                  <a:schemeClr val="tx1"/>
+                </a:solidFill>
+              </a:rPr>
+              <a:t>Spotify and Google </a:t>
+            </a:r>
+            <a:r>
+              <a:rPr lang="es-ES" dirty="0" err="1">
+                <a:solidFill>
+                  <a:schemeClr val="tx1"/>
+                </a:solidFill>
+              </a:rPr>
+              <a:t>Maps</a:t>
+            </a:r>
+            <a:r>
+              <a:rPr lang="es-ES" dirty="0">
+                <a:solidFill>
+                  <a:schemeClr val="tx1"/>
+                </a:solidFill>
+              </a:rPr>
+              <a:t> API</a:t>
+            </a:r>
+          </a:p>
+          <a:p>
+            <a:pPr marL="0" indent="0">
+              <a:buNone/>
+            </a:pPr>
+            <a:endParaRPr lang="es-ES" dirty="0"/>
+          </a:p>
+        </p:txBody>
+      </p:sp>
+      <p:pic>
+        <p:nvPicPr>
+          <p:cNvPr id="6" name="Imagen 5">
+            <a:extLst>
+              <a:ext uri="{FF2B5EF4-FFF2-40B4-BE49-F238E27FC236}">
+                <a16:creationId xmlns:a16="http://schemas.microsoft.com/office/drawing/2014/main" id="{9608D0DA-380F-4311-BEB9-E279AF86816E}"/>
+              </a:ext>
+            </a:extLst>
+          </p:cNvPr>
+          <p:cNvPicPr>
+            <a:picLocks noChangeAspect="1"/>
+          </p:cNvPicPr>
+          <p:nvPr/>
+        </p:nvPicPr>
+        <p:blipFill>
+          <a:blip r:embed="rId2">
+            <a:extLst>
+              <a:ext uri="{28A0092B-C50C-407E-A947-70E740481C1C}">
+                <a14:useLocalDpi xmlns:a14="http://schemas.microsoft.com/office/drawing/2010/main" val="0"/>
+              </a:ext>
+            </a:extLst>
+          </a:blip>
+          <a:stretch>
+            <a:fillRect/>
+          </a:stretch>
+        </p:blipFill>
+        <p:spPr>
+          <a:xfrm>
+            <a:off x="3146376" y="4266142"/>
+            <a:ext cx="4962525" cy="2305050"/>
+          </a:xfrm>
+          <a:prstGeom prst="rect">
+            <a:avLst/>
+          </a:prstGeom>
+        </p:spPr>
+      </p:pic>
     </p:spTree>
     <p:extLst>
       <p:ext uri="{BB962C8B-B14F-4D97-AF65-F5344CB8AC3E}">
-        <p14:creationId xmlns:p14="http://schemas.microsoft.com/office/powerpoint/2010/main" val="2200108933"/>
+        <p14:creationId xmlns:p14="http://schemas.microsoft.com/office/powerpoint/2010/main" val="2355842224"/>
       </p:ext>
     </p:extLst>
   </p:cSld>
@@ -8971,7 +11229,7 @@
           <a:p>
             <a:r>
               <a:rPr lang="es-ES" dirty="0"/>
-              <a:t>INNOVATION PLACEHOLDER</a:t>
+              <a:t>SYSTEM STRUCTURE</a:t>
             </a:r>
           </a:p>
         </p:txBody>
@@ -8994,7 +11252,7 @@
         </p:nvSpPr>
         <p:spPr>
           <a:xfrm>
-            <a:off x="684212" y="1669003"/>
+            <a:off x="586556" y="1320554"/>
             <a:ext cx="8534400" cy="4216892"/>
           </a:xfrm>
         </p:spPr>
@@ -9004,14 +11262,264 @@
           </a:bodyPr>
           <a:lstStyle/>
           <a:p>
+            <a:pPr marL="0" indent="0">
+              <a:buNone/>
+            </a:pPr>
+            <a:r>
+              <a:rPr lang="es-ES" dirty="0" err="1">
+                <a:solidFill>
+                  <a:schemeClr val="tx1"/>
+                </a:solidFill>
+              </a:rPr>
+              <a:t>Option</a:t>
+            </a:r>
+            <a:r>
+              <a:rPr lang="es-ES" dirty="0">
+                <a:solidFill>
+                  <a:schemeClr val="tx1"/>
+                </a:solidFill>
+              </a:rPr>
+              <a:t> B:</a:t>
+            </a:r>
+          </a:p>
+          <a:p>
+            <a:r>
+              <a:rPr lang="es-ES" dirty="0">
+                <a:solidFill>
+                  <a:schemeClr val="tx1"/>
+                </a:solidFill>
+              </a:rPr>
+              <a:t>Django app (Python), </a:t>
+            </a:r>
+            <a:r>
+              <a:rPr lang="es-ES" dirty="0" err="1">
+                <a:solidFill>
+                  <a:schemeClr val="tx1"/>
+                </a:solidFill>
+              </a:rPr>
+              <a:t>deployed</a:t>
+            </a:r>
+            <a:r>
+              <a:rPr lang="es-ES" dirty="0">
+                <a:solidFill>
+                  <a:schemeClr val="tx1"/>
+                </a:solidFill>
+              </a:rPr>
+              <a:t> in </a:t>
+            </a:r>
+            <a:r>
+              <a:rPr lang="es-ES" dirty="0" err="1">
+                <a:solidFill>
+                  <a:schemeClr val="tx1"/>
+                </a:solidFill>
+              </a:rPr>
+              <a:t>Heroku</a:t>
+            </a:r>
+            <a:endParaRPr lang="es-ES" dirty="0">
+              <a:solidFill>
+                <a:schemeClr val="tx1"/>
+              </a:solidFill>
+            </a:endParaRPr>
+          </a:p>
+          <a:p>
+            <a:r>
+              <a:rPr lang="es-ES" dirty="0" err="1">
+                <a:solidFill>
+                  <a:schemeClr val="tx1"/>
+                </a:solidFill>
+              </a:rPr>
+              <a:t>RESTful</a:t>
+            </a:r>
+            <a:r>
+              <a:rPr lang="es-ES" dirty="0">
+                <a:solidFill>
+                  <a:schemeClr val="tx1"/>
+                </a:solidFill>
+              </a:rPr>
+              <a:t> API, in Django </a:t>
+            </a:r>
+            <a:r>
+              <a:rPr lang="es-ES" dirty="0" err="1">
+                <a:solidFill>
+                  <a:schemeClr val="tx1"/>
+                </a:solidFill>
+              </a:rPr>
+              <a:t>or</a:t>
+            </a:r>
+            <a:r>
+              <a:rPr lang="es-ES" dirty="0">
+                <a:solidFill>
+                  <a:schemeClr val="tx1"/>
+                </a:solidFill>
+              </a:rPr>
+              <a:t> Node.js, </a:t>
+            </a:r>
+            <a:r>
+              <a:rPr lang="es-ES" dirty="0" err="1">
+                <a:solidFill>
+                  <a:schemeClr val="tx1"/>
+                </a:solidFill>
+              </a:rPr>
+              <a:t>deployed</a:t>
+            </a:r>
+            <a:r>
+              <a:rPr lang="es-ES" dirty="0">
+                <a:solidFill>
+                  <a:schemeClr val="tx1"/>
+                </a:solidFill>
+              </a:rPr>
+              <a:t> in </a:t>
+            </a:r>
+            <a:r>
+              <a:rPr lang="es-ES" dirty="0" err="1">
+                <a:solidFill>
+                  <a:schemeClr val="tx1"/>
+                </a:solidFill>
+              </a:rPr>
+              <a:t>Heroku</a:t>
+            </a:r>
+            <a:endParaRPr lang="es-ES" dirty="0">
+              <a:solidFill>
+                <a:schemeClr val="tx1"/>
+              </a:solidFill>
+            </a:endParaRPr>
+          </a:p>
+          <a:p>
+            <a:r>
+              <a:rPr lang="es-ES" dirty="0">
+                <a:solidFill>
+                  <a:schemeClr val="tx1"/>
+                </a:solidFill>
+              </a:rPr>
+              <a:t>PostgreSQL, </a:t>
+            </a:r>
+            <a:r>
+              <a:rPr lang="es-ES" dirty="0" err="1">
+                <a:solidFill>
+                  <a:schemeClr val="tx1"/>
+                </a:solidFill>
+              </a:rPr>
+              <a:t>also</a:t>
+            </a:r>
+            <a:r>
+              <a:rPr lang="es-ES" dirty="0">
+                <a:solidFill>
+                  <a:schemeClr val="tx1"/>
+                </a:solidFill>
+              </a:rPr>
+              <a:t> </a:t>
+            </a:r>
+            <a:r>
+              <a:rPr lang="es-ES" dirty="0" err="1">
+                <a:solidFill>
+                  <a:schemeClr val="tx1"/>
+                </a:solidFill>
+              </a:rPr>
+              <a:t>deployed</a:t>
+            </a:r>
+            <a:r>
+              <a:rPr lang="es-ES" dirty="0">
+                <a:solidFill>
+                  <a:schemeClr val="tx1"/>
+                </a:solidFill>
+              </a:rPr>
+              <a:t> in </a:t>
+            </a:r>
+            <a:r>
+              <a:rPr lang="es-ES" dirty="0" err="1">
+                <a:solidFill>
+                  <a:schemeClr val="tx1"/>
+                </a:solidFill>
+              </a:rPr>
+              <a:t>Heroku</a:t>
+            </a:r>
+            <a:endParaRPr lang="es-ES" dirty="0">
+              <a:solidFill>
+                <a:schemeClr val="tx1"/>
+              </a:solidFill>
+            </a:endParaRPr>
+          </a:p>
+          <a:p>
+            <a:r>
+              <a:rPr lang="es-ES" dirty="0">
+                <a:solidFill>
+                  <a:schemeClr val="tx1"/>
+                </a:solidFill>
+              </a:rPr>
+              <a:t>Spotify and Google </a:t>
+            </a:r>
+            <a:r>
+              <a:rPr lang="es-ES" dirty="0" err="1">
+                <a:solidFill>
+                  <a:schemeClr val="tx1"/>
+                </a:solidFill>
+              </a:rPr>
+              <a:t>Maps</a:t>
+            </a:r>
+            <a:r>
+              <a:rPr lang="es-ES" dirty="0">
+                <a:solidFill>
+                  <a:schemeClr val="tx1"/>
+                </a:solidFill>
+              </a:rPr>
+              <a:t> API</a:t>
+            </a:r>
+          </a:p>
+          <a:p>
+            <a:endParaRPr lang="es-ES" dirty="0">
+              <a:solidFill>
+                <a:schemeClr val="tx1"/>
+              </a:solidFill>
+            </a:endParaRPr>
+          </a:p>
+          <a:p>
+            <a:pPr marL="0" indent="0">
+              <a:buNone/>
+            </a:pPr>
             <a:endParaRPr lang="es-ES" dirty="0"/>
           </a:p>
         </p:txBody>
       </p:sp>
+      <p:pic>
+        <p:nvPicPr>
+          <p:cNvPr id="5" name="Imagen 4">
+            <a:extLst>
+              <a:ext uri="{FF2B5EF4-FFF2-40B4-BE49-F238E27FC236}">
+                <a16:creationId xmlns:a16="http://schemas.microsoft.com/office/drawing/2014/main" id="{B5AC28E1-4574-4108-87F6-6EDFDF394F25}"/>
+              </a:ext>
+            </a:extLst>
+          </p:cNvPr>
+          <p:cNvPicPr>
+            <a:picLocks noChangeAspect="1"/>
+          </p:cNvPicPr>
+          <p:nvPr/>
+        </p:nvPicPr>
+        <p:blipFill>
+          <a:blip r:embed="rId2">
+            <a:extLst>
+              <a:ext uri="{28A0092B-C50C-407E-A947-70E740481C1C}">
+                <a14:useLocalDpi xmlns:a14="http://schemas.microsoft.com/office/drawing/2010/main" val="0"/>
+              </a:ext>
+            </a:extLst>
+          </a:blip>
+          <a:stretch>
+            <a:fillRect/>
+          </a:stretch>
+        </p:blipFill>
+        <p:spPr>
+          <a:xfrm>
+            <a:off x="3368022" y="4119241"/>
+            <a:ext cx="4031745" cy="2596717"/>
+          </a:xfrm>
+          <a:prstGeom prst="rect">
+            <a:avLst/>
+          </a:prstGeom>
+        </p:spPr>
+      </p:pic>
     </p:spTree>
     <p:extLst>
       <p:ext uri="{BB962C8B-B14F-4D97-AF65-F5344CB8AC3E}">
-        <p14:creationId xmlns:p14="http://schemas.microsoft.com/office/powerpoint/2010/main" val="3747163501"/>
+        <p14:creationId xmlns:p14="http://schemas.microsoft.com/office/powerpoint/2010/main" val="1779052239"/>
       </p:ext>
     </p:extLst>
   </p:cSld>

</xml_diff>